<commit_message>
- criando estrutura de viewmodel
</commit_message>
<xml_diff>
--- a/edu/prototipos/presentation.pptx
+++ b/edu/prototipos/presentation.pptx
@@ -7,6 +7,8 @@
   <p:sldIdLst>
     <p:sldId id="256" r:id="rId2"/>
     <p:sldId id="257" r:id="rId3"/>
+    <p:sldId id="258" r:id="rId4"/>
+    <p:sldId id="259" r:id="rId5"/>
   </p:sldIdLst>
   <p:sldSz cx="12192000" cy="6858000"/>
   <p:notesSz cx="6858000" cy="9144000"/>
@@ -105,6 +107,11 @@
       </a:defRPr>
     </a:lvl9pPr>
   </p:defaultTextStyle>
+  <p:extLst>
+    <p:ext uri="{EFAFB233-063F-42B5-8137-9DF3F51BA10A}">
+      <p15:sldGuideLst xmlns:p15="http://schemas.microsoft.com/office/powerpoint/2012/main"/>
+    </p:ext>
+  </p:extLst>
 </p:presentation>
 </file>
 
@@ -255,7 +262,7 @@
           <a:p>
             <a:fld id="{25DDC539-B3D2-43E1-A8F9-EB2DD790F4D0}" type="datetimeFigureOut">
               <a:rPr lang="pt-BR" smtClean="0"/>
-              <a:t>17/08/2022</a:t>
+              <a:t>18/08/2022</a:t>
             </a:fld>
             <a:endParaRPr lang="pt-BR"/>
           </a:p>
@@ -453,7 +460,7 @@
           <a:p>
             <a:fld id="{25DDC539-B3D2-43E1-A8F9-EB2DD790F4D0}" type="datetimeFigureOut">
               <a:rPr lang="pt-BR" smtClean="0"/>
-              <a:t>17/08/2022</a:t>
+              <a:t>18/08/2022</a:t>
             </a:fld>
             <a:endParaRPr lang="pt-BR"/>
           </a:p>
@@ -661,7 +668,7 @@
           <a:p>
             <a:fld id="{25DDC539-B3D2-43E1-A8F9-EB2DD790F4D0}" type="datetimeFigureOut">
               <a:rPr lang="pt-BR" smtClean="0"/>
-              <a:t>17/08/2022</a:t>
+              <a:t>18/08/2022</a:t>
             </a:fld>
             <a:endParaRPr lang="pt-BR"/>
           </a:p>
@@ -859,7 +866,7 @@
           <a:p>
             <a:fld id="{25DDC539-B3D2-43E1-A8F9-EB2DD790F4D0}" type="datetimeFigureOut">
               <a:rPr lang="pt-BR" smtClean="0"/>
-              <a:t>17/08/2022</a:t>
+              <a:t>18/08/2022</a:t>
             </a:fld>
             <a:endParaRPr lang="pt-BR"/>
           </a:p>
@@ -1134,7 +1141,7 @@
           <a:p>
             <a:fld id="{25DDC539-B3D2-43E1-A8F9-EB2DD790F4D0}" type="datetimeFigureOut">
               <a:rPr lang="pt-BR" smtClean="0"/>
-              <a:t>17/08/2022</a:t>
+              <a:t>18/08/2022</a:t>
             </a:fld>
             <a:endParaRPr lang="pt-BR"/>
           </a:p>
@@ -1399,7 +1406,7 @@
           <a:p>
             <a:fld id="{25DDC539-B3D2-43E1-A8F9-EB2DD790F4D0}" type="datetimeFigureOut">
               <a:rPr lang="pt-BR" smtClean="0"/>
-              <a:t>17/08/2022</a:t>
+              <a:t>18/08/2022</a:t>
             </a:fld>
             <a:endParaRPr lang="pt-BR"/>
           </a:p>
@@ -1811,7 +1818,7 @@
           <a:p>
             <a:fld id="{25DDC539-B3D2-43E1-A8F9-EB2DD790F4D0}" type="datetimeFigureOut">
               <a:rPr lang="pt-BR" smtClean="0"/>
-              <a:t>17/08/2022</a:t>
+              <a:t>18/08/2022</a:t>
             </a:fld>
             <a:endParaRPr lang="pt-BR"/>
           </a:p>
@@ -1952,7 +1959,7 @@
           <a:p>
             <a:fld id="{25DDC539-B3D2-43E1-A8F9-EB2DD790F4D0}" type="datetimeFigureOut">
               <a:rPr lang="pt-BR" smtClean="0"/>
-              <a:t>17/08/2022</a:t>
+              <a:t>18/08/2022</a:t>
             </a:fld>
             <a:endParaRPr lang="pt-BR"/>
           </a:p>
@@ -2065,7 +2072,7 @@
           <a:p>
             <a:fld id="{25DDC539-B3D2-43E1-A8F9-EB2DD790F4D0}" type="datetimeFigureOut">
               <a:rPr lang="pt-BR" smtClean="0"/>
-              <a:t>17/08/2022</a:t>
+              <a:t>18/08/2022</a:t>
             </a:fld>
             <a:endParaRPr lang="pt-BR"/>
           </a:p>
@@ -2376,7 +2383,7 @@
           <a:p>
             <a:fld id="{25DDC539-B3D2-43E1-A8F9-EB2DD790F4D0}" type="datetimeFigureOut">
               <a:rPr lang="pt-BR" smtClean="0"/>
-              <a:t>17/08/2022</a:t>
+              <a:t>18/08/2022</a:t>
             </a:fld>
             <a:endParaRPr lang="pt-BR"/>
           </a:p>
@@ -2664,7 +2671,7 @@
           <a:p>
             <a:fld id="{25DDC539-B3D2-43E1-A8F9-EB2DD790F4D0}" type="datetimeFigureOut">
               <a:rPr lang="pt-BR" smtClean="0"/>
-              <a:t>17/08/2022</a:t>
+              <a:t>18/08/2022</a:t>
             </a:fld>
             <a:endParaRPr lang="pt-BR"/>
           </a:p>
@@ -2905,7 +2912,7 @@
           <a:p>
             <a:fld id="{25DDC539-B3D2-43E1-A8F9-EB2DD790F4D0}" type="datetimeFigureOut">
               <a:rPr lang="pt-BR" smtClean="0"/>
-              <a:t>17/08/2022</a:t>
+              <a:t>18/08/2022</a:t>
             </a:fld>
             <a:endParaRPr lang="pt-BR"/>
           </a:p>
@@ -4589,6 +4596,1934 @@
 </p:sld>
 </file>
 
+<file path=ppt/slides/slide3.xml><?xml version="1.0" encoding="utf-8"?>
+<p:sld xmlns:a="http://schemas.openxmlformats.org/drawingml/2006/main" xmlns:r="http://schemas.openxmlformats.org/officeDocument/2006/relationships" xmlns:p="http://schemas.openxmlformats.org/presentationml/2006/main">
+  <p:cSld>
+    <p:spTree>
+      <p:nvGrpSpPr>
+        <p:cNvPr id="1" name=""/>
+        <p:cNvGrpSpPr/>
+        <p:nvPr/>
+      </p:nvGrpSpPr>
+      <p:grpSpPr>
+        <a:xfrm>
+          <a:off x="0" y="0"/>
+          <a:ext cx="0" cy="0"/>
+          <a:chOff x="0" y="0"/>
+          <a:chExt cx="0" cy="0"/>
+        </a:xfrm>
+      </p:grpSpPr>
+      <p:sp>
+        <p:nvSpPr>
+          <p:cNvPr id="2" name="Retângulo 1">
+            <a:extLst>
+              <a:ext uri="{FF2B5EF4-FFF2-40B4-BE49-F238E27FC236}">
+                <a16:creationId xmlns:a16="http://schemas.microsoft.com/office/drawing/2014/main" id="{2119B720-BB9E-8E53-CF1E-A978522A3200}"/>
+              </a:ext>
+            </a:extLst>
+          </p:cNvPr>
+          <p:cNvSpPr/>
+          <p:nvPr/>
+        </p:nvSpPr>
+        <p:spPr>
+          <a:xfrm>
+            <a:off x="1778466" y="1149293"/>
+            <a:ext cx="2634143" cy="3926046"/>
+          </a:xfrm>
+          <a:prstGeom prst="rect">
+            <a:avLst/>
+          </a:prstGeom>
+          <a:solidFill>
+            <a:schemeClr val="accent2"/>
+          </a:solidFill>
+          <a:ln>
+            <a:noFill/>
+          </a:ln>
+        </p:spPr>
+        <p:style>
+          <a:lnRef idx="2">
+            <a:schemeClr val="accent1">
+              <a:shade val="50000"/>
+            </a:schemeClr>
+          </a:lnRef>
+          <a:fillRef idx="1">
+            <a:schemeClr val="accent1"/>
+          </a:fillRef>
+          <a:effectRef idx="0">
+            <a:schemeClr val="accent1"/>
+          </a:effectRef>
+          <a:fontRef idx="minor">
+            <a:schemeClr val="lt1"/>
+          </a:fontRef>
+        </p:style>
+        <p:txBody>
+          <a:bodyPr rtlCol="0" anchor="t"/>
+          <a:lstStyle/>
+          <a:p>
+            <a:pPr algn="ctr"/>
+            <a:r>
+              <a:rPr lang="pt-BR" dirty="0" err="1"/>
+              <a:t>View</a:t>
+            </a:r>
+            <a:endParaRPr lang="pt-BR" dirty="0"/>
+          </a:p>
+          <a:p>
+            <a:pPr algn="ctr"/>
+            <a:r>
+              <a:rPr lang="pt-BR" sz="1200" dirty="0"/>
+              <a:t>.</a:t>
+            </a:r>
+            <a:r>
+              <a:rPr lang="pt-BR" sz="1200" dirty="0" err="1"/>
+              <a:t>xaml</a:t>
+            </a:r>
+            <a:r>
+              <a:rPr lang="pt-BR" sz="1200" dirty="0"/>
+              <a:t> + </a:t>
+            </a:r>
+            <a:r>
+              <a:rPr lang="pt-BR" sz="1200" dirty="0">
+                <a:solidFill>
+                  <a:schemeClr val="tx1"/>
+                </a:solidFill>
+                <a:highlight>
+                  <a:srgbClr val="C0C0C0"/>
+                </a:highlight>
+              </a:rPr>
+              <a:t>.</a:t>
+            </a:r>
+            <a:r>
+              <a:rPr lang="pt-BR" sz="1200" dirty="0" err="1">
+                <a:solidFill>
+                  <a:schemeClr val="tx1"/>
+                </a:solidFill>
+                <a:highlight>
+                  <a:srgbClr val="C0C0C0"/>
+                </a:highlight>
+              </a:rPr>
+              <a:t>xaml.cs</a:t>
+            </a:r>
+            <a:endParaRPr lang="pt-BR" sz="1200" dirty="0">
+              <a:solidFill>
+                <a:schemeClr val="tx1"/>
+              </a:solidFill>
+              <a:highlight>
+                <a:srgbClr val="C0C0C0"/>
+              </a:highlight>
+            </a:endParaRPr>
+          </a:p>
+        </p:txBody>
+      </p:sp>
+      <p:grpSp>
+        <p:nvGrpSpPr>
+          <p:cNvPr id="11" name="Agrupar 10">
+            <a:extLst>
+              <a:ext uri="{FF2B5EF4-FFF2-40B4-BE49-F238E27FC236}">
+                <a16:creationId xmlns:a16="http://schemas.microsoft.com/office/drawing/2014/main" id="{5A23D865-C26F-A3BF-7170-F7B5B09B6BBA}"/>
+              </a:ext>
+            </a:extLst>
+          </p:cNvPr>
+          <p:cNvGrpSpPr/>
+          <p:nvPr/>
+        </p:nvGrpSpPr>
+        <p:grpSpPr>
+          <a:xfrm>
+            <a:off x="2046914" y="1929467"/>
+            <a:ext cx="2080469" cy="2768367"/>
+            <a:chOff x="2046914" y="1963024"/>
+            <a:chExt cx="2080469" cy="1994482"/>
+          </a:xfrm>
+        </p:grpSpPr>
+        <p:sp>
+          <p:nvSpPr>
+            <p:cNvPr id="3" name="Retângulo 2">
+              <a:extLst>
+                <a:ext uri="{FF2B5EF4-FFF2-40B4-BE49-F238E27FC236}">
+                  <a16:creationId xmlns:a16="http://schemas.microsoft.com/office/drawing/2014/main" id="{7ED3655B-93B3-DAE3-C785-980FDB6FDD17}"/>
+                </a:ext>
+              </a:extLst>
+            </p:cNvPr>
+            <p:cNvSpPr/>
+            <p:nvPr/>
+          </p:nvSpPr>
+          <p:spPr>
+            <a:xfrm>
+              <a:off x="2046914" y="1963024"/>
+              <a:ext cx="2080469" cy="545284"/>
+            </a:xfrm>
+            <a:prstGeom prst="rect">
+              <a:avLst/>
+            </a:prstGeom>
+            <a:solidFill>
+              <a:schemeClr val="tx1"/>
+            </a:solidFill>
+            <a:ln>
+              <a:noFill/>
+            </a:ln>
+          </p:spPr>
+          <p:style>
+            <a:lnRef idx="2">
+              <a:schemeClr val="accent1">
+                <a:shade val="50000"/>
+              </a:schemeClr>
+            </a:lnRef>
+            <a:fillRef idx="1">
+              <a:schemeClr val="accent1"/>
+            </a:fillRef>
+            <a:effectRef idx="0">
+              <a:schemeClr val="accent1"/>
+            </a:effectRef>
+            <a:fontRef idx="minor">
+              <a:schemeClr val="lt1"/>
+            </a:fontRef>
+          </p:style>
+          <p:txBody>
+            <a:bodyPr rtlCol="0" anchor="ctr"/>
+            <a:lstStyle/>
+            <a:p>
+              <a:pPr algn="ctr"/>
+              <a:r>
+                <a:rPr lang="pt-BR" dirty="0" err="1"/>
+                <a:t>TextBox</a:t>
+              </a:r>
+              <a:endParaRPr lang="pt-BR" dirty="0"/>
+            </a:p>
+          </p:txBody>
+        </p:sp>
+        <p:sp>
+          <p:nvSpPr>
+            <p:cNvPr id="4" name="Retângulo 3">
+              <a:extLst>
+                <a:ext uri="{FF2B5EF4-FFF2-40B4-BE49-F238E27FC236}">
+                  <a16:creationId xmlns:a16="http://schemas.microsoft.com/office/drawing/2014/main" id="{5676B348-3B1C-AD37-B862-75DC2B80FEBC}"/>
+                </a:ext>
+              </a:extLst>
+            </p:cNvPr>
+            <p:cNvSpPr/>
+            <p:nvPr/>
+          </p:nvSpPr>
+          <p:spPr>
+            <a:xfrm>
+              <a:off x="2046914" y="2676088"/>
+              <a:ext cx="2080469" cy="545284"/>
+            </a:xfrm>
+            <a:prstGeom prst="rect">
+              <a:avLst/>
+            </a:prstGeom>
+            <a:solidFill>
+              <a:schemeClr val="tx1"/>
+            </a:solidFill>
+            <a:ln>
+              <a:noFill/>
+            </a:ln>
+          </p:spPr>
+          <p:style>
+            <a:lnRef idx="2">
+              <a:schemeClr val="accent1">
+                <a:shade val="50000"/>
+              </a:schemeClr>
+            </a:lnRef>
+            <a:fillRef idx="1">
+              <a:schemeClr val="accent1"/>
+            </a:fillRef>
+            <a:effectRef idx="0">
+              <a:schemeClr val="accent1"/>
+            </a:effectRef>
+            <a:fontRef idx="minor">
+              <a:schemeClr val="lt1"/>
+            </a:fontRef>
+          </p:style>
+          <p:txBody>
+            <a:bodyPr rtlCol="0" anchor="ctr"/>
+            <a:lstStyle/>
+            <a:p>
+              <a:pPr algn="ctr"/>
+              <a:r>
+                <a:rPr lang="pt-BR" dirty="0" err="1"/>
+                <a:t>DatePicker</a:t>
+              </a:r>
+              <a:endParaRPr lang="pt-BR" dirty="0"/>
+            </a:p>
+          </p:txBody>
+        </p:sp>
+        <p:sp>
+          <p:nvSpPr>
+            <p:cNvPr id="5" name="Retângulo 4">
+              <a:extLst>
+                <a:ext uri="{FF2B5EF4-FFF2-40B4-BE49-F238E27FC236}">
+                  <a16:creationId xmlns:a16="http://schemas.microsoft.com/office/drawing/2014/main" id="{80F8CA67-F4D7-930C-78DD-66879F7CB2C3}"/>
+                </a:ext>
+              </a:extLst>
+            </p:cNvPr>
+            <p:cNvSpPr/>
+            <p:nvPr/>
+          </p:nvSpPr>
+          <p:spPr>
+            <a:xfrm>
+              <a:off x="2046914" y="3412222"/>
+              <a:ext cx="2080469" cy="545284"/>
+            </a:xfrm>
+            <a:prstGeom prst="rect">
+              <a:avLst/>
+            </a:prstGeom>
+            <a:solidFill>
+              <a:schemeClr val="tx1"/>
+            </a:solidFill>
+            <a:ln>
+              <a:noFill/>
+            </a:ln>
+          </p:spPr>
+          <p:style>
+            <a:lnRef idx="2">
+              <a:schemeClr val="accent1">
+                <a:shade val="50000"/>
+              </a:schemeClr>
+            </a:lnRef>
+            <a:fillRef idx="1">
+              <a:schemeClr val="accent1"/>
+            </a:fillRef>
+            <a:effectRef idx="0">
+              <a:schemeClr val="accent1"/>
+            </a:effectRef>
+            <a:fontRef idx="minor">
+              <a:schemeClr val="lt1"/>
+            </a:fontRef>
+          </p:style>
+          <p:txBody>
+            <a:bodyPr rtlCol="0" anchor="ctr"/>
+            <a:lstStyle/>
+            <a:p>
+              <a:pPr algn="ctr"/>
+              <a:r>
+                <a:rPr lang="pt-BR" dirty="0"/>
+                <a:t>Button</a:t>
+              </a:r>
+            </a:p>
+          </p:txBody>
+        </p:sp>
+      </p:grpSp>
+      <p:sp>
+        <p:nvSpPr>
+          <p:cNvPr id="6" name="Retângulo 5">
+            <a:extLst>
+              <a:ext uri="{FF2B5EF4-FFF2-40B4-BE49-F238E27FC236}">
+                <a16:creationId xmlns:a16="http://schemas.microsoft.com/office/drawing/2014/main" id="{D7251D95-392A-1A2B-3EDD-793B0236A9A8}"/>
+              </a:ext>
+            </a:extLst>
+          </p:cNvPr>
+          <p:cNvSpPr/>
+          <p:nvPr/>
+        </p:nvSpPr>
+        <p:spPr>
+          <a:xfrm>
+            <a:off x="7935985" y="1149293"/>
+            <a:ext cx="2634143" cy="2279707"/>
+          </a:xfrm>
+          <a:prstGeom prst="rect">
+            <a:avLst/>
+          </a:prstGeom>
+          <a:solidFill>
+            <a:schemeClr val="accent2"/>
+          </a:solidFill>
+          <a:ln>
+            <a:noFill/>
+          </a:ln>
+        </p:spPr>
+        <p:style>
+          <a:lnRef idx="2">
+            <a:schemeClr val="accent1">
+              <a:shade val="50000"/>
+            </a:schemeClr>
+          </a:lnRef>
+          <a:fillRef idx="1">
+            <a:schemeClr val="accent1"/>
+          </a:fillRef>
+          <a:effectRef idx="0">
+            <a:schemeClr val="accent1"/>
+          </a:effectRef>
+          <a:fontRef idx="minor">
+            <a:schemeClr val="lt1"/>
+          </a:fontRef>
+        </p:style>
+        <p:txBody>
+          <a:bodyPr rtlCol="0" anchor="t"/>
+          <a:lstStyle/>
+          <a:p>
+            <a:pPr algn="ctr"/>
+            <a:r>
+              <a:rPr lang="pt-BR" dirty="0"/>
+              <a:t>Model</a:t>
+            </a:r>
+          </a:p>
+          <a:p>
+            <a:pPr algn="ctr"/>
+            <a:r>
+              <a:rPr lang="pt-BR" sz="1200" dirty="0" err="1"/>
+              <a:t>Funcionario</a:t>
+            </a:r>
+            <a:endParaRPr lang="pt-BR" dirty="0">
+              <a:solidFill>
+                <a:schemeClr val="tx1"/>
+              </a:solidFill>
+              <a:highlight>
+                <a:srgbClr val="C0C0C0"/>
+              </a:highlight>
+            </a:endParaRPr>
+          </a:p>
+        </p:txBody>
+      </p:sp>
+      <p:sp>
+        <p:nvSpPr>
+          <p:cNvPr id="8" name="Retângulo 7">
+            <a:extLst>
+              <a:ext uri="{FF2B5EF4-FFF2-40B4-BE49-F238E27FC236}">
+                <a16:creationId xmlns:a16="http://schemas.microsoft.com/office/drawing/2014/main" id="{C600BF95-CE06-71F1-751B-7E2B90C21CBD}"/>
+              </a:ext>
+            </a:extLst>
+          </p:cNvPr>
+          <p:cNvSpPr/>
+          <p:nvPr/>
+        </p:nvSpPr>
+        <p:spPr>
+          <a:xfrm>
+            <a:off x="7306810" y="1939954"/>
+            <a:ext cx="2080469" cy="545284"/>
+          </a:xfrm>
+          <a:prstGeom prst="rect">
+            <a:avLst/>
+          </a:prstGeom>
+          <a:solidFill>
+            <a:schemeClr val="tx1"/>
+          </a:solidFill>
+          <a:ln>
+            <a:noFill/>
+          </a:ln>
+        </p:spPr>
+        <p:style>
+          <a:lnRef idx="2">
+            <a:schemeClr val="accent1">
+              <a:shade val="50000"/>
+            </a:schemeClr>
+          </a:lnRef>
+          <a:fillRef idx="1">
+            <a:schemeClr val="accent1"/>
+          </a:fillRef>
+          <a:effectRef idx="0">
+            <a:schemeClr val="accent1"/>
+          </a:effectRef>
+          <a:fontRef idx="minor">
+            <a:schemeClr val="lt1"/>
+          </a:fontRef>
+        </p:style>
+        <p:txBody>
+          <a:bodyPr rtlCol="0" anchor="ctr"/>
+          <a:lstStyle/>
+          <a:p>
+            <a:pPr algn="ctr"/>
+            <a:r>
+              <a:rPr lang="pt-BR" dirty="0" err="1"/>
+              <a:t>NomeCompleto</a:t>
+            </a:r>
+            <a:endParaRPr lang="pt-BR" dirty="0"/>
+          </a:p>
+        </p:txBody>
+      </p:sp>
+      <p:sp>
+        <p:nvSpPr>
+          <p:cNvPr id="9" name="Retângulo 8">
+            <a:extLst>
+              <a:ext uri="{FF2B5EF4-FFF2-40B4-BE49-F238E27FC236}">
+                <a16:creationId xmlns:a16="http://schemas.microsoft.com/office/drawing/2014/main" id="{BAEAFBC1-7385-1BF7-A301-826CA024451C}"/>
+              </a:ext>
+            </a:extLst>
+          </p:cNvPr>
+          <p:cNvSpPr/>
+          <p:nvPr/>
+        </p:nvSpPr>
+        <p:spPr>
+          <a:xfrm>
+            <a:off x="7306811" y="2676088"/>
+            <a:ext cx="2080469" cy="545284"/>
+          </a:xfrm>
+          <a:prstGeom prst="rect">
+            <a:avLst/>
+          </a:prstGeom>
+          <a:solidFill>
+            <a:schemeClr val="tx1"/>
+          </a:solidFill>
+          <a:ln>
+            <a:noFill/>
+          </a:ln>
+        </p:spPr>
+        <p:style>
+          <a:lnRef idx="2">
+            <a:schemeClr val="accent1">
+              <a:shade val="50000"/>
+            </a:schemeClr>
+          </a:lnRef>
+          <a:fillRef idx="1">
+            <a:schemeClr val="accent1"/>
+          </a:fillRef>
+          <a:effectRef idx="0">
+            <a:schemeClr val="accent1"/>
+          </a:effectRef>
+          <a:fontRef idx="minor">
+            <a:schemeClr val="lt1"/>
+          </a:fontRef>
+        </p:style>
+        <p:txBody>
+          <a:bodyPr rtlCol="0" anchor="ctr"/>
+          <a:lstStyle/>
+          <a:p>
+            <a:pPr algn="ctr"/>
+            <a:r>
+              <a:rPr lang="pt-BR" dirty="0" err="1"/>
+              <a:t>DataEntrada</a:t>
+            </a:r>
+            <a:endParaRPr lang="pt-BR" dirty="0"/>
+          </a:p>
+        </p:txBody>
+      </p:sp>
+      <p:sp>
+        <p:nvSpPr>
+          <p:cNvPr id="10" name="Retângulo 9">
+            <a:extLst>
+              <a:ext uri="{FF2B5EF4-FFF2-40B4-BE49-F238E27FC236}">
+                <a16:creationId xmlns:a16="http://schemas.microsoft.com/office/drawing/2014/main" id="{69EE220B-1BA7-BB51-6DA4-EC44FAC48AB8}"/>
+              </a:ext>
+            </a:extLst>
+          </p:cNvPr>
+          <p:cNvSpPr/>
+          <p:nvPr/>
+        </p:nvSpPr>
+        <p:spPr>
+          <a:xfrm>
+            <a:off x="7935985" y="3481432"/>
+            <a:ext cx="2634143" cy="1593908"/>
+          </a:xfrm>
+          <a:prstGeom prst="rect">
+            <a:avLst/>
+          </a:prstGeom>
+          <a:solidFill>
+            <a:schemeClr val="accent2"/>
+          </a:solidFill>
+          <a:ln>
+            <a:noFill/>
+          </a:ln>
+        </p:spPr>
+        <p:style>
+          <a:lnRef idx="2">
+            <a:schemeClr val="accent1">
+              <a:shade val="50000"/>
+            </a:schemeClr>
+          </a:lnRef>
+          <a:fillRef idx="1">
+            <a:schemeClr val="accent1"/>
+          </a:fillRef>
+          <a:effectRef idx="0">
+            <a:schemeClr val="accent1"/>
+          </a:effectRef>
+          <a:fontRef idx="minor">
+            <a:schemeClr val="lt1"/>
+          </a:fontRef>
+        </p:style>
+        <p:txBody>
+          <a:bodyPr rtlCol="0" anchor="t"/>
+          <a:lstStyle/>
+          <a:p>
+            <a:pPr algn="ctr"/>
+            <a:r>
+              <a:rPr lang="pt-BR" dirty="0" err="1"/>
+              <a:t>DataProvider</a:t>
+            </a:r>
+            <a:endParaRPr lang="pt-BR" dirty="0"/>
+          </a:p>
+          <a:p>
+            <a:pPr algn="ctr"/>
+            <a:r>
+              <a:rPr lang="pt-BR" sz="1200" dirty="0" err="1">
+                <a:solidFill>
+                  <a:schemeClr val="tx1"/>
+                </a:solidFill>
+                <a:highlight>
+                  <a:srgbClr val="C0C0C0"/>
+                </a:highlight>
+              </a:rPr>
+              <a:t>FuncionarioDataProvider</a:t>
+            </a:r>
+            <a:endParaRPr lang="pt-BR" sz="1200" dirty="0">
+              <a:solidFill>
+                <a:schemeClr val="tx1"/>
+              </a:solidFill>
+              <a:highlight>
+                <a:srgbClr val="C0C0C0"/>
+              </a:highlight>
+            </a:endParaRPr>
+          </a:p>
+        </p:txBody>
+      </p:sp>
+    </p:spTree>
+    <p:extLst>
+      <p:ext uri="{BB962C8B-B14F-4D97-AF65-F5344CB8AC3E}">
+        <p14:creationId xmlns:p14="http://schemas.microsoft.com/office/powerpoint/2010/main" val="3816254126"/>
+      </p:ext>
+    </p:extLst>
+  </p:cSld>
+  <p:clrMapOvr>
+    <a:masterClrMapping/>
+  </p:clrMapOvr>
+</p:sld>
+</file>
+
+<file path=ppt/slides/slide4.xml><?xml version="1.0" encoding="utf-8"?>
+<p:sld xmlns:a="http://schemas.openxmlformats.org/drawingml/2006/main" xmlns:r="http://schemas.openxmlformats.org/officeDocument/2006/relationships" xmlns:p="http://schemas.openxmlformats.org/presentationml/2006/main">
+  <p:cSld>
+    <p:spTree>
+      <p:nvGrpSpPr>
+        <p:cNvPr id="1" name=""/>
+        <p:cNvGrpSpPr/>
+        <p:nvPr/>
+      </p:nvGrpSpPr>
+      <p:grpSpPr>
+        <a:xfrm>
+          <a:off x="0" y="0"/>
+          <a:ext cx="0" cy="0"/>
+          <a:chOff x="0" y="0"/>
+          <a:chExt cx="0" cy="0"/>
+        </a:xfrm>
+      </p:grpSpPr>
+      <p:sp>
+        <p:nvSpPr>
+          <p:cNvPr id="36" name="Retângulo 35">
+            <a:extLst>
+              <a:ext uri="{FF2B5EF4-FFF2-40B4-BE49-F238E27FC236}">
+                <a16:creationId xmlns:a16="http://schemas.microsoft.com/office/drawing/2014/main" id="{B705701F-18A4-1808-A7CD-8AD02E8B8B5F}"/>
+              </a:ext>
+            </a:extLst>
+          </p:cNvPr>
+          <p:cNvSpPr/>
+          <p:nvPr/>
+        </p:nvSpPr>
+        <p:spPr>
+          <a:xfrm>
+            <a:off x="4282580" y="501242"/>
+            <a:ext cx="7378118" cy="5855515"/>
+          </a:xfrm>
+          <a:prstGeom prst="rect">
+            <a:avLst/>
+          </a:prstGeom>
+          <a:solidFill>
+            <a:srgbClr val="7030A0"/>
+          </a:solidFill>
+          <a:ln>
+            <a:noFill/>
+          </a:ln>
+        </p:spPr>
+        <p:style>
+          <a:lnRef idx="2">
+            <a:schemeClr val="accent1">
+              <a:shade val="50000"/>
+            </a:schemeClr>
+          </a:lnRef>
+          <a:fillRef idx="1">
+            <a:schemeClr val="accent1"/>
+          </a:fillRef>
+          <a:effectRef idx="0">
+            <a:schemeClr val="accent1"/>
+          </a:effectRef>
+          <a:fontRef idx="minor">
+            <a:schemeClr val="lt1"/>
+          </a:fontRef>
+        </p:style>
+        <p:txBody>
+          <a:bodyPr rtlCol="0" anchor="t"/>
+          <a:lstStyle/>
+          <a:p>
+            <a:pPr algn="ctr"/>
+            <a:r>
+              <a:rPr lang="pt-BR" dirty="0"/>
+              <a:t>Independência da UI </a:t>
+            </a:r>
+            <a:r>
+              <a:rPr lang="pt-BR" sz="1200" dirty="0"/>
+              <a:t>(facilita manutenção e testes)</a:t>
+            </a:r>
+            <a:endParaRPr lang="pt-BR" dirty="0"/>
+          </a:p>
+        </p:txBody>
+      </p:sp>
+      <p:sp>
+        <p:nvSpPr>
+          <p:cNvPr id="2" name="Retângulo 1">
+            <a:extLst>
+              <a:ext uri="{FF2B5EF4-FFF2-40B4-BE49-F238E27FC236}">
+                <a16:creationId xmlns:a16="http://schemas.microsoft.com/office/drawing/2014/main" id="{2119B720-BB9E-8E53-CF1E-A978522A3200}"/>
+              </a:ext>
+            </a:extLst>
+          </p:cNvPr>
+          <p:cNvSpPr/>
+          <p:nvPr/>
+        </p:nvSpPr>
+        <p:spPr>
+          <a:xfrm>
+            <a:off x="528506" y="1474366"/>
+            <a:ext cx="2634143" cy="3926046"/>
+          </a:xfrm>
+          <a:prstGeom prst="rect">
+            <a:avLst/>
+          </a:prstGeom>
+          <a:solidFill>
+            <a:schemeClr val="accent2"/>
+          </a:solidFill>
+          <a:ln>
+            <a:noFill/>
+          </a:ln>
+        </p:spPr>
+        <p:style>
+          <a:lnRef idx="2">
+            <a:schemeClr val="accent1">
+              <a:shade val="50000"/>
+            </a:schemeClr>
+          </a:lnRef>
+          <a:fillRef idx="1">
+            <a:schemeClr val="accent1"/>
+          </a:fillRef>
+          <a:effectRef idx="0">
+            <a:schemeClr val="accent1"/>
+          </a:effectRef>
+          <a:fontRef idx="minor">
+            <a:schemeClr val="lt1"/>
+          </a:fontRef>
+        </p:style>
+        <p:txBody>
+          <a:bodyPr rtlCol="0" anchor="t"/>
+          <a:lstStyle/>
+          <a:p>
+            <a:pPr algn="ctr"/>
+            <a:r>
+              <a:rPr lang="pt-BR" dirty="0" err="1"/>
+              <a:t>View</a:t>
+            </a:r>
+            <a:endParaRPr lang="pt-BR" dirty="0"/>
+          </a:p>
+          <a:p>
+            <a:pPr algn="ctr"/>
+            <a:r>
+              <a:rPr lang="pt-BR" sz="1200" dirty="0"/>
+              <a:t>.</a:t>
+            </a:r>
+            <a:r>
+              <a:rPr lang="pt-BR" sz="1200" dirty="0" err="1"/>
+              <a:t>xaml</a:t>
+            </a:r>
+            <a:r>
+              <a:rPr lang="pt-BR" sz="1200" dirty="0"/>
+              <a:t> + </a:t>
+            </a:r>
+            <a:r>
+              <a:rPr lang="pt-BR" sz="1200" dirty="0">
+                <a:solidFill>
+                  <a:schemeClr val="tx1"/>
+                </a:solidFill>
+                <a:highlight>
+                  <a:srgbClr val="C0C0C0"/>
+                </a:highlight>
+              </a:rPr>
+              <a:t>.</a:t>
+            </a:r>
+            <a:r>
+              <a:rPr lang="pt-BR" sz="1200" dirty="0" err="1">
+                <a:solidFill>
+                  <a:schemeClr val="tx1"/>
+                </a:solidFill>
+                <a:highlight>
+                  <a:srgbClr val="C0C0C0"/>
+                </a:highlight>
+              </a:rPr>
+              <a:t>xaml.cs</a:t>
+            </a:r>
+            <a:endParaRPr lang="pt-BR" sz="1200" dirty="0">
+              <a:solidFill>
+                <a:schemeClr val="tx1"/>
+              </a:solidFill>
+              <a:highlight>
+                <a:srgbClr val="C0C0C0"/>
+              </a:highlight>
+            </a:endParaRPr>
+          </a:p>
+        </p:txBody>
+      </p:sp>
+      <p:grpSp>
+        <p:nvGrpSpPr>
+          <p:cNvPr id="11" name="Agrupar 10">
+            <a:extLst>
+              <a:ext uri="{FF2B5EF4-FFF2-40B4-BE49-F238E27FC236}">
+                <a16:creationId xmlns:a16="http://schemas.microsoft.com/office/drawing/2014/main" id="{5A23D865-C26F-A3BF-7170-F7B5B09B6BBA}"/>
+              </a:ext>
+            </a:extLst>
+          </p:cNvPr>
+          <p:cNvGrpSpPr/>
+          <p:nvPr/>
+        </p:nvGrpSpPr>
+        <p:grpSpPr>
+          <a:xfrm>
+            <a:off x="796954" y="2254540"/>
+            <a:ext cx="2848063" cy="2768367"/>
+            <a:chOff x="2046914" y="1963024"/>
+            <a:chExt cx="2848063" cy="1994482"/>
+          </a:xfrm>
+        </p:grpSpPr>
+        <p:sp>
+          <p:nvSpPr>
+            <p:cNvPr id="3" name="Retângulo 2">
+              <a:extLst>
+                <a:ext uri="{FF2B5EF4-FFF2-40B4-BE49-F238E27FC236}">
+                  <a16:creationId xmlns:a16="http://schemas.microsoft.com/office/drawing/2014/main" id="{7ED3655B-93B3-DAE3-C785-980FDB6FDD17}"/>
+                </a:ext>
+              </a:extLst>
+            </p:cNvPr>
+            <p:cNvSpPr/>
+            <p:nvPr/>
+          </p:nvSpPr>
+          <p:spPr>
+            <a:xfrm>
+              <a:off x="2046914" y="1963024"/>
+              <a:ext cx="2080469" cy="545284"/>
+            </a:xfrm>
+            <a:prstGeom prst="rect">
+              <a:avLst/>
+            </a:prstGeom>
+            <a:solidFill>
+              <a:schemeClr val="tx1"/>
+            </a:solidFill>
+            <a:ln>
+              <a:noFill/>
+            </a:ln>
+          </p:spPr>
+          <p:style>
+            <a:lnRef idx="2">
+              <a:schemeClr val="accent1">
+                <a:shade val="50000"/>
+              </a:schemeClr>
+            </a:lnRef>
+            <a:fillRef idx="1">
+              <a:schemeClr val="accent1"/>
+            </a:fillRef>
+            <a:effectRef idx="0">
+              <a:schemeClr val="accent1"/>
+            </a:effectRef>
+            <a:fontRef idx="minor">
+              <a:schemeClr val="lt1"/>
+            </a:fontRef>
+          </p:style>
+          <p:txBody>
+            <a:bodyPr rtlCol="0" anchor="ctr"/>
+            <a:lstStyle/>
+            <a:p>
+              <a:pPr algn="ctr"/>
+              <a:r>
+                <a:rPr lang="pt-BR" dirty="0" err="1"/>
+                <a:t>TextBox</a:t>
+              </a:r>
+              <a:endParaRPr lang="pt-BR" dirty="0"/>
+            </a:p>
+          </p:txBody>
+        </p:sp>
+        <p:sp>
+          <p:nvSpPr>
+            <p:cNvPr id="4" name="Retângulo 3">
+              <a:extLst>
+                <a:ext uri="{FF2B5EF4-FFF2-40B4-BE49-F238E27FC236}">
+                  <a16:creationId xmlns:a16="http://schemas.microsoft.com/office/drawing/2014/main" id="{5676B348-3B1C-AD37-B862-75DC2B80FEBC}"/>
+                </a:ext>
+              </a:extLst>
+            </p:cNvPr>
+            <p:cNvSpPr/>
+            <p:nvPr/>
+          </p:nvSpPr>
+          <p:spPr>
+            <a:xfrm>
+              <a:off x="2046914" y="2676088"/>
+              <a:ext cx="2080469" cy="545284"/>
+            </a:xfrm>
+            <a:prstGeom prst="rect">
+              <a:avLst/>
+            </a:prstGeom>
+            <a:solidFill>
+              <a:schemeClr val="tx1"/>
+            </a:solidFill>
+            <a:ln>
+              <a:noFill/>
+            </a:ln>
+          </p:spPr>
+          <p:style>
+            <a:lnRef idx="2">
+              <a:schemeClr val="accent1">
+                <a:shade val="50000"/>
+              </a:schemeClr>
+            </a:lnRef>
+            <a:fillRef idx="1">
+              <a:schemeClr val="accent1"/>
+            </a:fillRef>
+            <a:effectRef idx="0">
+              <a:schemeClr val="accent1"/>
+            </a:effectRef>
+            <a:fontRef idx="minor">
+              <a:schemeClr val="lt1"/>
+            </a:fontRef>
+          </p:style>
+          <p:txBody>
+            <a:bodyPr rtlCol="0" anchor="ctr"/>
+            <a:lstStyle/>
+            <a:p>
+              <a:pPr algn="ctr"/>
+              <a:r>
+                <a:rPr lang="pt-BR" dirty="0" err="1"/>
+                <a:t>DatePicker</a:t>
+              </a:r>
+              <a:endParaRPr lang="pt-BR" dirty="0"/>
+            </a:p>
+          </p:txBody>
+        </p:sp>
+        <p:sp>
+          <p:nvSpPr>
+            <p:cNvPr id="5" name="Retângulo 4">
+              <a:extLst>
+                <a:ext uri="{FF2B5EF4-FFF2-40B4-BE49-F238E27FC236}">
+                  <a16:creationId xmlns:a16="http://schemas.microsoft.com/office/drawing/2014/main" id="{80F8CA67-F4D7-930C-78DD-66879F7CB2C3}"/>
+                </a:ext>
+              </a:extLst>
+            </p:cNvPr>
+            <p:cNvSpPr/>
+            <p:nvPr/>
+          </p:nvSpPr>
+          <p:spPr>
+            <a:xfrm>
+              <a:off x="2046914" y="3412222"/>
+              <a:ext cx="2080469" cy="545284"/>
+            </a:xfrm>
+            <a:prstGeom prst="rect">
+              <a:avLst/>
+            </a:prstGeom>
+            <a:solidFill>
+              <a:schemeClr val="tx1"/>
+            </a:solidFill>
+            <a:ln>
+              <a:noFill/>
+            </a:ln>
+          </p:spPr>
+          <p:style>
+            <a:lnRef idx="2">
+              <a:schemeClr val="accent1">
+                <a:shade val="50000"/>
+              </a:schemeClr>
+            </a:lnRef>
+            <a:fillRef idx="1">
+              <a:schemeClr val="accent1"/>
+            </a:fillRef>
+            <a:effectRef idx="0">
+              <a:schemeClr val="accent1"/>
+            </a:effectRef>
+            <a:fontRef idx="minor">
+              <a:schemeClr val="lt1"/>
+            </a:fontRef>
+          </p:style>
+          <p:txBody>
+            <a:bodyPr rtlCol="0" anchor="ctr"/>
+            <a:lstStyle/>
+            <a:p>
+              <a:pPr algn="ctr"/>
+              <a:r>
+                <a:rPr lang="pt-BR" dirty="0"/>
+                <a:t>Button</a:t>
+              </a:r>
+            </a:p>
+          </p:txBody>
+        </p:sp>
+        <p:sp>
+          <p:nvSpPr>
+            <p:cNvPr id="18" name="Retângulo 17">
+              <a:extLst>
+                <a:ext uri="{FF2B5EF4-FFF2-40B4-BE49-F238E27FC236}">
+                  <a16:creationId xmlns:a16="http://schemas.microsoft.com/office/drawing/2014/main" id="{E94443D7-07E9-ECEA-4576-6A54B9ACE436}"/>
+                </a:ext>
+              </a:extLst>
+            </p:cNvPr>
+            <p:cNvSpPr/>
+            <p:nvPr/>
+          </p:nvSpPr>
+          <p:spPr>
+            <a:xfrm>
+              <a:off x="3703742" y="2030903"/>
+              <a:ext cx="1191235" cy="392852"/>
+            </a:xfrm>
+            <a:prstGeom prst="rect">
+              <a:avLst/>
+            </a:prstGeom>
+            <a:solidFill>
+              <a:schemeClr val="bg2">
+                <a:lumMod val="50000"/>
+              </a:schemeClr>
+            </a:solidFill>
+            <a:ln>
+              <a:noFill/>
+            </a:ln>
+          </p:spPr>
+          <p:style>
+            <a:lnRef idx="2">
+              <a:schemeClr val="accent1">
+                <a:shade val="50000"/>
+              </a:schemeClr>
+            </a:lnRef>
+            <a:fillRef idx="1">
+              <a:schemeClr val="accent1"/>
+            </a:fillRef>
+            <a:effectRef idx="0">
+              <a:schemeClr val="accent1"/>
+            </a:effectRef>
+            <a:fontRef idx="minor">
+              <a:schemeClr val="lt1"/>
+            </a:fontRef>
+          </p:style>
+          <p:txBody>
+            <a:bodyPr rtlCol="0" anchor="ctr"/>
+            <a:lstStyle/>
+            <a:p>
+              <a:pPr algn="ctr"/>
+              <a:r>
+                <a:rPr lang="pt-BR" dirty="0" err="1"/>
+                <a:t>Text</a:t>
+              </a:r>
+              <a:endParaRPr lang="pt-BR" dirty="0"/>
+            </a:p>
+          </p:txBody>
+        </p:sp>
+        <p:sp>
+          <p:nvSpPr>
+            <p:cNvPr id="19" name="Retângulo 18">
+              <a:extLst>
+                <a:ext uri="{FF2B5EF4-FFF2-40B4-BE49-F238E27FC236}">
+                  <a16:creationId xmlns:a16="http://schemas.microsoft.com/office/drawing/2014/main" id="{7E231352-5538-16CE-4F2C-77BF483A0093}"/>
+                </a:ext>
+              </a:extLst>
+            </p:cNvPr>
+            <p:cNvSpPr/>
+            <p:nvPr/>
+          </p:nvSpPr>
+          <p:spPr>
+            <a:xfrm>
+              <a:off x="3703742" y="2745535"/>
+              <a:ext cx="1191235" cy="392852"/>
+            </a:xfrm>
+            <a:prstGeom prst="rect">
+              <a:avLst/>
+            </a:prstGeom>
+            <a:solidFill>
+              <a:schemeClr val="bg2">
+                <a:lumMod val="50000"/>
+              </a:schemeClr>
+            </a:solidFill>
+            <a:ln>
+              <a:noFill/>
+            </a:ln>
+          </p:spPr>
+          <p:style>
+            <a:lnRef idx="2">
+              <a:schemeClr val="accent1">
+                <a:shade val="50000"/>
+              </a:schemeClr>
+            </a:lnRef>
+            <a:fillRef idx="1">
+              <a:schemeClr val="accent1"/>
+            </a:fillRef>
+            <a:effectRef idx="0">
+              <a:schemeClr val="accent1"/>
+            </a:effectRef>
+            <a:fontRef idx="minor">
+              <a:schemeClr val="lt1"/>
+            </a:fontRef>
+          </p:style>
+          <p:txBody>
+            <a:bodyPr rtlCol="0" anchor="ctr"/>
+            <a:lstStyle/>
+            <a:p>
+              <a:pPr algn="ctr"/>
+              <a:r>
+                <a:rPr lang="pt-BR" sz="1100" dirty="0" err="1"/>
+                <a:t>Selected</a:t>
+              </a:r>
+              <a:endParaRPr lang="pt-BR" dirty="0"/>
+            </a:p>
+            <a:p>
+              <a:pPr algn="ctr"/>
+              <a:r>
+                <a:rPr lang="pt-BR" dirty="0"/>
+                <a:t>Date</a:t>
+              </a:r>
+            </a:p>
+          </p:txBody>
+        </p:sp>
+        <p:sp>
+          <p:nvSpPr>
+            <p:cNvPr id="31" name="Retângulo 30">
+              <a:extLst>
+                <a:ext uri="{FF2B5EF4-FFF2-40B4-BE49-F238E27FC236}">
+                  <a16:creationId xmlns:a16="http://schemas.microsoft.com/office/drawing/2014/main" id="{E5699E3D-C4CB-4A29-E64B-61199F1F614C}"/>
+                </a:ext>
+              </a:extLst>
+            </p:cNvPr>
+            <p:cNvSpPr/>
+            <p:nvPr/>
+          </p:nvSpPr>
+          <p:spPr>
+            <a:xfrm>
+              <a:off x="3703742" y="3485907"/>
+              <a:ext cx="1191235" cy="392852"/>
+            </a:xfrm>
+            <a:prstGeom prst="rect">
+              <a:avLst/>
+            </a:prstGeom>
+            <a:solidFill>
+              <a:schemeClr val="bg2">
+                <a:lumMod val="50000"/>
+              </a:schemeClr>
+            </a:solidFill>
+            <a:ln>
+              <a:noFill/>
+            </a:ln>
+          </p:spPr>
+          <p:style>
+            <a:lnRef idx="2">
+              <a:schemeClr val="accent1">
+                <a:shade val="50000"/>
+              </a:schemeClr>
+            </a:lnRef>
+            <a:fillRef idx="1">
+              <a:schemeClr val="accent1"/>
+            </a:fillRef>
+            <a:effectRef idx="0">
+              <a:schemeClr val="accent1"/>
+            </a:effectRef>
+            <a:fontRef idx="minor">
+              <a:schemeClr val="lt1"/>
+            </a:fontRef>
+          </p:style>
+          <p:txBody>
+            <a:bodyPr rtlCol="0" anchor="ctr"/>
+            <a:lstStyle/>
+            <a:p>
+              <a:pPr algn="ctr"/>
+              <a:r>
+                <a:rPr lang="pt-BR" dirty="0"/>
+                <a:t>Click</a:t>
+              </a:r>
+            </a:p>
+          </p:txBody>
+        </p:sp>
+      </p:grpSp>
+      <p:sp>
+        <p:nvSpPr>
+          <p:cNvPr id="6" name="Retângulo 5">
+            <a:extLst>
+              <a:ext uri="{FF2B5EF4-FFF2-40B4-BE49-F238E27FC236}">
+                <a16:creationId xmlns:a16="http://schemas.microsoft.com/office/drawing/2014/main" id="{D7251D95-392A-1A2B-3EDD-793B0236A9A8}"/>
+              </a:ext>
+            </a:extLst>
+          </p:cNvPr>
+          <p:cNvSpPr/>
+          <p:nvPr/>
+        </p:nvSpPr>
+        <p:spPr>
+          <a:xfrm>
+            <a:off x="8850385" y="1474366"/>
+            <a:ext cx="2634143" cy="2279707"/>
+          </a:xfrm>
+          <a:prstGeom prst="rect">
+            <a:avLst/>
+          </a:prstGeom>
+          <a:solidFill>
+            <a:schemeClr val="accent2"/>
+          </a:solidFill>
+          <a:ln>
+            <a:noFill/>
+          </a:ln>
+        </p:spPr>
+        <p:style>
+          <a:lnRef idx="2">
+            <a:schemeClr val="accent1">
+              <a:shade val="50000"/>
+            </a:schemeClr>
+          </a:lnRef>
+          <a:fillRef idx="1">
+            <a:schemeClr val="accent1"/>
+          </a:fillRef>
+          <a:effectRef idx="0">
+            <a:schemeClr val="accent1"/>
+          </a:effectRef>
+          <a:fontRef idx="minor">
+            <a:schemeClr val="lt1"/>
+          </a:fontRef>
+        </p:style>
+        <p:txBody>
+          <a:bodyPr rtlCol="0" anchor="t"/>
+          <a:lstStyle/>
+          <a:p>
+            <a:pPr algn="ctr"/>
+            <a:r>
+              <a:rPr lang="pt-BR" dirty="0"/>
+              <a:t>Model</a:t>
+            </a:r>
+          </a:p>
+          <a:p>
+            <a:pPr algn="ctr"/>
+            <a:r>
+              <a:rPr lang="pt-BR" sz="1200" dirty="0" err="1"/>
+              <a:t>Funcionario</a:t>
+            </a:r>
+            <a:endParaRPr lang="pt-BR" dirty="0">
+              <a:solidFill>
+                <a:schemeClr val="tx1"/>
+              </a:solidFill>
+              <a:highlight>
+                <a:srgbClr val="C0C0C0"/>
+              </a:highlight>
+            </a:endParaRPr>
+          </a:p>
+        </p:txBody>
+      </p:sp>
+      <p:sp>
+        <p:nvSpPr>
+          <p:cNvPr id="8" name="Retângulo 7">
+            <a:extLst>
+              <a:ext uri="{FF2B5EF4-FFF2-40B4-BE49-F238E27FC236}">
+                <a16:creationId xmlns:a16="http://schemas.microsoft.com/office/drawing/2014/main" id="{C600BF95-CE06-71F1-751B-7E2B90C21CBD}"/>
+              </a:ext>
+            </a:extLst>
+          </p:cNvPr>
+          <p:cNvSpPr/>
+          <p:nvPr/>
+        </p:nvSpPr>
+        <p:spPr>
+          <a:xfrm>
+            <a:off x="8221210" y="2265027"/>
+            <a:ext cx="2080469" cy="545284"/>
+          </a:xfrm>
+          <a:prstGeom prst="rect">
+            <a:avLst/>
+          </a:prstGeom>
+          <a:solidFill>
+            <a:schemeClr val="tx1"/>
+          </a:solidFill>
+          <a:ln>
+            <a:noFill/>
+          </a:ln>
+        </p:spPr>
+        <p:style>
+          <a:lnRef idx="2">
+            <a:schemeClr val="accent1">
+              <a:shade val="50000"/>
+            </a:schemeClr>
+          </a:lnRef>
+          <a:fillRef idx="1">
+            <a:schemeClr val="accent1"/>
+          </a:fillRef>
+          <a:effectRef idx="0">
+            <a:schemeClr val="accent1"/>
+          </a:effectRef>
+          <a:fontRef idx="minor">
+            <a:schemeClr val="lt1"/>
+          </a:fontRef>
+        </p:style>
+        <p:txBody>
+          <a:bodyPr rtlCol="0" anchor="ctr"/>
+          <a:lstStyle/>
+          <a:p>
+            <a:pPr algn="ctr"/>
+            <a:r>
+              <a:rPr lang="pt-BR" dirty="0" err="1"/>
+              <a:t>NomeCompleto</a:t>
+            </a:r>
+            <a:endParaRPr lang="pt-BR" dirty="0"/>
+          </a:p>
+        </p:txBody>
+      </p:sp>
+      <p:sp>
+        <p:nvSpPr>
+          <p:cNvPr id="9" name="Retângulo 8">
+            <a:extLst>
+              <a:ext uri="{FF2B5EF4-FFF2-40B4-BE49-F238E27FC236}">
+                <a16:creationId xmlns:a16="http://schemas.microsoft.com/office/drawing/2014/main" id="{BAEAFBC1-7385-1BF7-A301-826CA024451C}"/>
+              </a:ext>
+            </a:extLst>
+          </p:cNvPr>
+          <p:cNvSpPr/>
+          <p:nvPr/>
+        </p:nvSpPr>
+        <p:spPr>
+          <a:xfrm>
+            <a:off x="8221211" y="3001161"/>
+            <a:ext cx="2080469" cy="545284"/>
+          </a:xfrm>
+          <a:prstGeom prst="rect">
+            <a:avLst/>
+          </a:prstGeom>
+          <a:solidFill>
+            <a:schemeClr val="tx1"/>
+          </a:solidFill>
+          <a:ln>
+            <a:noFill/>
+          </a:ln>
+        </p:spPr>
+        <p:style>
+          <a:lnRef idx="2">
+            <a:schemeClr val="accent1">
+              <a:shade val="50000"/>
+            </a:schemeClr>
+          </a:lnRef>
+          <a:fillRef idx="1">
+            <a:schemeClr val="accent1"/>
+          </a:fillRef>
+          <a:effectRef idx="0">
+            <a:schemeClr val="accent1"/>
+          </a:effectRef>
+          <a:fontRef idx="minor">
+            <a:schemeClr val="lt1"/>
+          </a:fontRef>
+        </p:style>
+        <p:txBody>
+          <a:bodyPr rtlCol="0" anchor="ctr"/>
+          <a:lstStyle/>
+          <a:p>
+            <a:pPr algn="ctr"/>
+            <a:r>
+              <a:rPr lang="pt-BR" dirty="0" err="1"/>
+              <a:t>DataEntrada</a:t>
+            </a:r>
+            <a:endParaRPr lang="pt-BR" dirty="0"/>
+          </a:p>
+        </p:txBody>
+      </p:sp>
+      <p:sp>
+        <p:nvSpPr>
+          <p:cNvPr id="10" name="Retângulo 9">
+            <a:extLst>
+              <a:ext uri="{FF2B5EF4-FFF2-40B4-BE49-F238E27FC236}">
+                <a16:creationId xmlns:a16="http://schemas.microsoft.com/office/drawing/2014/main" id="{69EE220B-1BA7-BB51-6DA4-EC44FAC48AB8}"/>
+              </a:ext>
+            </a:extLst>
+          </p:cNvPr>
+          <p:cNvSpPr/>
+          <p:nvPr/>
+        </p:nvSpPr>
+        <p:spPr>
+          <a:xfrm>
+            <a:off x="8850385" y="3806505"/>
+            <a:ext cx="2634143" cy="1593908"/>
+          </a:xfrm>
+          <a:prstGeom prst="rect">
+            <a:avLst/>
+          </a:prstGeom>
+          <a:solidFill>
+            <a:schemeClr val="accent2"/>
+          </a:solidFill>
+          <a:ln>
+            <a:noFill/>
+          </a:ln>
+        </p:spPr>
+        <p:style>
+          <a:lnRef idx="2">
+            <a:schemeClr val="accent1">
+              <a:shade val="50000"/>
+            </a:schemeClr>
+          </a:lnRef>
+          <a:fillRef idx="1">
+            <a:schemeClr val="accent1"/>
+          </a:fillRef>
+          <a:effectRef idx="0">
+            <a:schemeClr val="accent1"/>
+          </a:effectRef>
+          <a:fontRef idx="minor">
+            <a:schemeClr val="lt1"/>
+          </a:fontRef>
+        </p:style>
+        <p:txBody>
+          <a:bodyPr rtlCol="0" anchor="t"/>
+          <a:lstStyle/>
+          <a:p>
+            <a:pPr algn="ctr"/>
+            <a:r>
+              <a:rPr lang="pt-BR" dirty="0" err="1"/>
+              <a:t>DataProvider</a:t>
+            </a:r>
+            <a:endParaRPr lang="pt-BR" dirty="0"/>
+          </a:p>
+          <a:p>
+            <a:pPr algn="ctr"/>
+            <a:r>
+              <a:rPr lang="pt-BR" sz="1200" dirty="0" err="1">
+                <a:solidFill>
+                  <a:schemeClr val="bg1"/>
+                </a:solidFill>
+              </a:rPr>
+              <a:t>FuncionarioDataProvider</a:t>
+            </a:r>
+            <a:endParaRPr lang="pt-BR" sz="1200" dirty="0">
+              <a:solidFill>
+                <a:schemeClr val="bg1"/>
+              </a:solidFill>
+            </a:endParaRPr>
+          </a:p>
+        </p:txBody>
+      </p:sp>
+      <p:sp>
+        <p:nvSpPr>
+          <p:cNvPr id="7" name="Retângulo 6">
+            <a:extLst>
+              <a:ext uri="{FF2B5EF4-FFF2-40B4-BE49-F238E27FC236}">
+                <a16:creationId xmlns:a16="http://schemas.microsoft.com/office/drawing/2014/main" id="{E1D1E74A-572B-FFE7-EE6D-773719650EB7}"/>
+              </a:ext>
+            </a:extLst>
+          </p:cNvPr>
+          <p:cNvSpPr/>
+          <p:nvPr/>
+        </p:nvSpPr>
+        <p:spPr>
+          <a:xfrm>
+            <a:off x="4689445" y="1474366"/>
+            <a:ext cx="2634143" cy="3926046"/>
+          </a:xfrm>
+          <a:prstGeom prst="rect">
+            <a:avLst/>
+          </a:prstGeom>
+          <a:solidFill>
+            <a:schemeClr val="accent2"/>
+          </a:solidFill>
+          <a:ln>
+            <a:noFill/>
+          </a:ln>
+        </p:spPr>
+        <p:style>
+          <a:lnRef idx="2">
+            <a:schemeClr val="accent1">
+              <a:shade val="50000"/>
+            </a:schemeClr>
+          </a:lnRef>
+          <a:fillRef idx="1">
+            <a:schemeClr val="accent1"/>
+          </a:fillRef>
+          <a:effectRef idx="0">
+            <a:schemeClr val="accent1"/>
+          </a:effectRef>
+          <a:fontRef idx="minor">
+            <a:schemeClr val="lt1"/>
+          </a:fontRef>
+        </p:style>
+        <p:txBody>
+          <a:bodyPr rtlCol="0" anchor="t"/>
+          <a:lstStyle/>
+          <a:p>
+            <a:pPr algn="ctr"/>
+            <a:r>
+              <a:rPr lang="pt-BR" dirty="0" err="1"/>
+              <a:t>ViewModel</a:t>
+            </a:r>
+            <a:endParaRPr lang="pt-BR" dirty="0"/>
+          </a:p>
+          <a:p>
+            <a:pPr algn="ctr"/>
+            <a:r>
+              <a:rPr lang="pt-BR" sz="1200" dirty="0" err="1"/>
+              <a:t>FuncionarioViewModel</a:t>
+            </a:r>
+            <a:endParaRPr lang="pt-BR" sz="1200" dirty="0">
+              <a:solidFill>
+                <a:schemeClr val="tx1"/>
+              </a:solidFill>
+              <a:highlight>
+                <a:srgbClr val="C0C0C0"/>
+              </a:highlight>
+            </a:endParaRPr>
+          </a:p>
+        </p:txBody>
+      </p:sp>
+      <p:sp>
+        <p:nvSpPr>
+          <p:cNvPr id="16" name="Retângulo 15">
+            <a:extLst>
+              <a:ext uri="{FF2B5EF4-FFF2-40B4-BE49-F238E27FC236}">
+                <a16:creationId xmlns:a16="http://schemas.microsoft.com/office/drawing/2014/main" id="{0460776A-4746-7379-ADED-DF3BD1A7506D}"/>
+              </a:ext>
+            </a:extLst>
+          </p:cNvPr>
+          <p:cNvSpPr/>
+          <p:nvPr/>
+        </p:nvSpPr>
+        <p:spPr>
+          <a:xfrm>
+            <a:off x="4337108" y="2265027"/>
+            <a:ext cx="2080469" cy="545284"/>
+          </a:xfrm>
+          <a:prstGeom prst="rect">
+            <a:avLst/>
+          </a:prstGeom>
+          <a:solidFill>
+            <a:schemeClr val="tx1"/>
+          </a:solidFill>
+          <a:ln>
+            <a:noFill/>
+          </a:ln>
+        </p:spPr>
+        <p:style>
+          <a:lnRef idx="2">
+            <a:schemeClr val="accent1">
+              <a:shade val="50000"/>
+            </a:schemeClr>
+          </a:lnRef>
+          <a:fillRef idx="1">
+            <a:schemeClr val="accent1"/>
+          </a:fillRef>
+          <a:effectRef idx="0">
+            <a:schemeClr val="accent1"/>
+          </a:effectRef>
+          <a:fontRef idx="minor">
+            <a:schemeClr val="lt1"/>
+          </a:fontRef>
+        </p:style>
+        <p:txBody>
+          <a:bodyPr rtlCol="0" anchor="ctr"/>
+          <a:lstStyle/>
+          <a:p>
+            <a:pPr algn="ctr"/>
+            <a:r>
+              <a:rPr lang="pt-BR" dirty="0" err="1"/>
+              <a:t>NomeCompleto</a:t>
+            </a:r>
+            <a:endParaRPr lang="pt-BR" dirty="0"/>
+          </a:p>
+        </p:txBody>
+      </p:sp>
+      <p:sp>
+        <p:nvSpPr>
+          <p:cNvPr id="17" name="Retângulo 16">
+            <a:extLst>
+              <a:ext uri="{FF2B5EF4-FFF2-40B4-BE49-F238E27FC236}">
+                <a16:creationId xmlns:a16="http://schemas.microsoft.com/office/drawing/2014/main" id="{0A1BB008-F4A2-490F-9274-066A66F90080}"/>
+              </a:ext>
+            </a:extLst>
+          </p:cNvPr>
+          <p:cNvSpPr/>
+          <p:nvPr/>
+        </p:nvSpPr>
+        <p:spPr>
+          <a:xfrm>
+            <a:off x="4337109" y="3261220"/>
+            <a:ext cx="2080469" cy="545284"/>
+          </a:xfrm>
+          <a:prstGeom prst="rect">
+            <a:avLst/>
+          </a:prstGeom>
+          <a:solidFill>
+            <a:schemeClr val="tx1"/>
+          </a:solidFill>
+          <a:ln>
+            <a:noFill/>
+          </a:ln>
+        </p:spPr>
+        <p:style>
+          <a:lnRef idx="2">
+            <a:schemeClr val="accent1">
+              <a:shade val="50000"/>
+            </a:schemeClr>
+          </a:lnRef>
+          <a:fillRef idx="1">
+            <a:schemeClr val="accent1"/>
+          </a:fillRef>
+          <a:effectRef idx="0">
+            <a:schemeClr val="accent1"/>
+          </a:effectRef>
+          <a:fontRef idx="minor">
+            <a:schemeClr val="lt1"/>
+          </a:fontRef>
+        </p:style>
+        <p:txBody>
+          <a:bodyPr rtlCol="0" anchor="ctr"/>
+          <a:lstStyle/>
+          <a:p>
+            <a:pPr algn="ctr"/>
+            <a:r>
+              <a:rPr lang="pt-BR" dirty="0" err="1"/>
+              <a:t>DataEntrada</a:t>
+            </a:r>
+            <a:endParaRPr lang="pt-BR" dirty="0"/>
+          </a:p>
+        </p:txBody>
+      </p:sp>
+      <p:cxnSp>
+        <p:nvCxnSpPr>
+          <p:cNvPr id="21" name="Conector reto 20">
+            <a:extLst>
+              <a:ext uri="{FF2B5EF4-FFF2-40B4-BE49-F238E27FC236}">
+                <a16:creationId xmlns:a16="http://schemas.microsoft.com/office/drawing/2014/main" id="{07EC89E9-E6B3-5257-492E-BE06E34519B1}"/>
+              </a:ext>
+            </a:extLst>
+          </p:cNvPr>
+          <p:cNvCxnSpPr>
+            <a:stCxn id="18" idx="3"/>
+            <a:endCxn id="16" idx="1"/>
+          </p:cNvCxnSpPr>
+          <p:nvPr/>
+        </p:nvCxnSpPr>
+        <p:spPr>
+          <a:xfrm flipV="1">
+            <a:off x="3645017" y="2537669"/>
+            <a:ext cx="692091" cy="83730"/>
+          </a:xfrm>
+          <a:prstGeom prst="line">
+            <a:avLst/>
+          </a:prstGeom>
+          <a:ln>
+            <a:solidFill>
+              <a:schemeClr val="tx1"/>
+            </a:solidFill>
+          </a:ln>
+        </p:spPr>
+        <p:style>
+          <a:lnRef idx="1">
+            <a:schemeClr val="accent1"/>
+          </a:lnRef>
+          <a:fillRef idx="0">
+            <a:schemeClr val="accent1"/>
+          </a:fillRef>
+          <a:effectRef idx="0">
+            <a:schemeClr val="accent1"/>
+          </a:effectRef>
+          <a:fontRef idx="minor">
+            <a:schemeClr val="tx1"/>
+          </a:fontRef>
+        </p:style>
+      </p:cxnSp>
+      <p:sp>
+        <p:nvSpPr>
+          <p:cNvPr id="22" name="CaixaDeTexto 21">
+            <a:extLst>
+              <a:ext uri="{FF2B5EF4-FFF2-40B4-BE49-F238E27FC236}">
+                <a16:creationId xmlns:a16="http://schemas.microsoft.com/office/drawing/2014/main" id="{A58FFD7A-AE5E-F9CB-6F06-8897E2636289}"/>
+              </a:ext>
+            </a:extLst>
+          </p:cNvPr>
+          <p:cNvSpPr txBox="1"/>
+          <p:nvPr/>
+        </p:nvSpPr>
+        <p:spPr>
+          <a:xfrm rot="21204723">
+            <a:off x="3656927" y="2307624"/>
+            <a:ext cx="612668" cy="261610"/>
+          </a:xfrm>
+          <a:prstGeom prst="rect">
+            <a:avLst/>
+          </a:prstGeom>
+          <a:noFill/>
+        </p:spPr>
+        <p:txBody>
+          <a:bodyPr wrap="none" rtlCol="0">
+            <a:spAutoFit/>
+          </a:bodyPr>
+          <a:lstStyle/>
+          <a:p>
+            <a:r>
+              <a:rPr lang="pt-BR" sz="1100" dirty="0" err="1"/>
+              <a:t>Binding</a:t>
+            </a:r>
+            <a:endParaRPr lang="pt-BR" sz="1100" dirty="0"/>
+          </a:p>
+        </p:txBody>
+      </p:sp>
+      <p:cxnSp>
+        <p:nvCxnSpPr>
+          <p:cNvPr id="23" name="Conector reto 22">
+            <a:extLst>
+              <a:ext uri="{FF2B5EF4-FFF2-40B4-BE49-F238E27FC236}">
+                <a16:creationId xmlns:a16="http://schemas.microsoft.com/office/drawing/2014/main" id="{AC2ED742-EAB6-D728-F09B-CEE5975775A9}"/>
+              </a:ext>
+            </a:extLst>
+          </p:cNvPr>
+          <p:cNvCxnSpPr>
+            <a:cxnSpLocks/>
+            <a:stCxn id="19" idx="3"/>
+            <a:endCxn id="17" idx="1"/>
+          </p:cNvCxnSpPr>
+          <p:nvPr/>
+        </p:nvCxnSpPr>
+        <p:spPr>
+          <a:xfrm flipV="1">
+            <a:off x="3645017" y="3533862"/>
+            <a:ext cx="692092" cy="79455"/>
+          </a:xfrm>
+          <a:prstGeom prst="line">
+            <a:avLst/>
+          </a:prstGeom>
+          <a:ln>
+            <a:solidFill>
+              <a:schemeClr val="tx1"/>
+            </a:solidFill>
+          </a:ln>
+        </p:spPr>
+        <p:style>
+          <a:lnRef idx="1">
+            <a:schemeClr val="accent1"/>
+          </a:lnRef>
+          <a:fillRef idx="0">
+            <a:schemeClr val="accent1"/>
+          </a:fillRef>
+          <a:effectRef idx="0">
+            <a:schemeClr val="accent1"/>
+          </a:effectRef>
+          <a:fontRef idx="minor">
+            <a:schemeClr val="tx1"/>
+          </a:fontRef>
+        </p:style>
+      </p:cxnSp>
+      <p:sp>
+        <p:nvSpPr>
+          <p:cNvPr id="24" name="CaixaDeTexto 23">
+            <a:extLst>
+              <a:ext uri="{FF2B5EF4-FFF2-40B4-BE49-F238E27FC236}">
+                <a16:creationId xmlns:a16="http://schemas.microsoft.com/office/drawing/2014/main" id="{F7BD6AFB-CBB3-A8FB-25C5-F0BE927191F6}"/>
+              </a:ext>
+            </a:extLst>
+          </p:cNvPr>
+          <p:cNvSpPr txBox="1"/>
+          <p:nvPr/>
+        </p:nvSpPr>
+        <p:spPr>
+          <a:xfrm rot="21204723">
+            <a:off x="3694677" y="3290570"/>
+            <a:ext cx="612668" cy="261610"/>
+          </a:xfrm>
+          <a:prstGeom prst="rect">
+            <a:avLst/>
+          </a:prstGeom>
+          <a:noFill/>
+        </p:spPr>
+        <p:txBody>
+          <a:bodyPr wrap="none" rtlCol="0">
+            <a:spAutoFit/>
+          </a:bodyPr>
+          <a:lstStyle/>
+          <a:p>
+            <a:r>
+              <a:rPr lang="pt-BR" sz="1100" dirty="0" err="1"/>
+              <a:t>Binding</a:t>
+            </a:r>
+            <a:endParaRPr lang="pt-BR" sz="1100" dirty="0"/>
+          </a:p>
+        </p:txBody>
+      </p:sp>
+      <p:sp>
+        <p:nvSpPr>
+          <p:cNvPr id="27" name="Seta: para a Direita 26">
+            <a:extLst>
+              <a:ext uri="{FF2B5EF4-FFF2-40B4-BE49-F238E27FC236}">
+                <a16:creationId xmlns:a16="http://schemas.microsoft.com/office/drawing/2014/main" id="{D185C27F-CF75-1F9F-6827-CE85B950C2C9}"/>
+              </a:ext>
+            </a:extLst>
+          </p:cNvPr>
+          <p:cNvSpPr/>
+          <p:nvPr/>
+        </p:nvSpPr>
+        <p:spPr>
+          <a:xfrm>
+            <a:off x="7571064" y="1658923"/>
+            <a:ext cx="1031845" cy="415254"/>
+          </a:xfrm>
+          <a:prstGeom prst="rightArrow">
+            <a:avLst/>
+          </a:prstGeom>
+          <a:solidFill>
+            <a:schemeClr val="tx1"/>
+          </a:solidFill>
+          <a:ln>
+            <a:noFill/>
+          </a:ln>
+        </p:spPr>
+        <p:style>
+          <a:lnRef idx="2">
+            <a:schemeClr val="accent1">
+              <a:shade val="50000"/>
+            </a:schemeClr>
+          </a:lnRef>
+          <a:fillRef idx="1">
+            <a:schemeClr val="accent1"/>
+          </a:fillRef>
+          <a:effectRef idx="0">
+            <a:schemeClr val="accent1"/>
+          </a:effectRef>
+          <a:fontRef idx="minor">
+            <a:schemeClr val="lt1"/>
+          </a:fontRef>
+        </p:style>
+        <p:txBody>
+          <a:bodyPr rtlCol="0" anchor="ctr"/>
+          <a:lstStyle/>
+          <a:p>
+            <a:pPr algn="ctr"/>
+            <a:r>
+              <a:rPr lang="pt-BR" sz="1200" dirty="0" err="1"/>
+              <a:t>using</a:t>
+            </a:r>
+            <a:endParaRPr lang="pt-BR" sz="1200" dirty="0"/>
+          </a:p>
+        </p:txBody>
+      </p:sp>
+      <p:sp>
+        <p:nvSpPr>
+          <p:cNvPr id="29" name="Retângulo 28">
+            <a:extLst>
+              <a:ext uri="{FF2B5EF4-FFF2-40B4-BE49-F238E27FC236}">
+                <a16:creationId xmlns:a16="http://schemas.microsoft.com/office/drawing/2014/main" id="{D75DF91F-4E19-13A2-ED00-7645E5D887A1}"/>
+              </a:ext>
+            </a:extLst>
+          </p:cNvPr>
+          <p:cNvSpPr/>
+          <p:nvPr/>
+        </p:nvSpPr>
+        <p:spPr>
+          <a:xfrm>
+            <a:off x="4337108" y="4290970"/>
+            <a:ext cx="2080469" cy="545284"/>
+          </a:xfrm>
+          <a:prstGeom prst="rect">
+            <a:avLst/>
+          </a:prstGeom>
+          <a:solidFill>
+            <a:schemeClr val="tx1"/>
+          </a:solidFill>
+          <a:ln>
+            <a:noFill/>
+          </a:ln>
+        </p:spPr>
+        <p:style>
+          <a:lnRef idx="2">
+            <a:schemeClr val="accent1">
+              <a:shade val="50000"/>
+            </a:schemeClr>
+          </a:lnRef>
+          <a:fillRef idx="1">
+            <a:schemeClr val="accent1"/>
+          </a:fillRef>
+          <a:effectRef idx="0">
+            <a:schemeClr val="accent1"/>
+          </a:effectRef>
+          <a:fontRef idx="minor">
+            <a:schemeClr val="lt1"/>
+          </a:fontRef>
+        </p:style>
+        <p:txBody>
+          <a:bodyPr rtlCol="0" anchor="ctr"/>
+          <a:lstStyle/>
+          <a:p>
+            <a:pPr algn="ctr"/>
+            <a:r>
+              <a:rPr lang="pt-BR" dirty="0"/>
+              <a:t>Salvar()</a:t>
+            </a:r>
+          </a:p>
+        </p:txBody>
+      </p:sp>
+      <p:cxnSp>
+        <p:nvCxnSpPr>
+          <p:cNvPr id="32" name="Conector reto 31">
+            <a:extLst>
+              <a:ext uri="{FF2B5EF4-FFF2-40B4-BE49-F238E27FC236}">
+                <a16:creationId xmlns:a16="http://schemas.microsoft.com/office/drawing/2014/main" id="{680EF236-9670-DA11-4A35-8989395A31DD}"/>
+              </a:ext>
+            </a:extLst>
+          </p:cNvPr>
+          <p:cNvCxnSpPr>
+            <a:cxnSpLocks/>
+            <a:stCxn id="31" idx="3"/>
+            <a:endCxn id="29" idx="1"/>
+          </p:cNvCxnSpPr>
+          <p:nvPr/>
+        </p:nvCxnSpPr>
+        <p:spPr>
+          <a:xfrm flipV="1">
+            <a:off x="3645017" y="4563612"/>
+            <a:ext cx="692091" cy="77351"/>
+          </a:xfrm>
+          <a:prstGeom prst="line">
+            <a:avLst/>
+          </a:prstGeom>
+          <a:ln>
+            <a:solidFill>
+              <a:schemeClr val="tx1"/>
+            </a:solidFill>
+          </a:ln>
+        </p:spPr>
+        <p:style>
+          <a:lnRef idx="1">
+            <a:schemeClr val="accent1"/>
+          </a:lnRef>
+          <a:fillRef idx="0">
+            <a:schemeClr val="accent1"/>
+          </a:fillRef>
+          <a:effectRef idx="0">
+            <a:schemeClr val="accent1"/>
+          </a:effectRef>
+          <a:fontRef idx="minor">
+            <a:schemeClr val="tx1"/>
+          </a:fontRef>
+        </p:style>
+      </p:cxnSp>
+      <p:sp>
+        <p:nvSpPr>
+          <p:cNvPr id="33" name="CaixaDeTexto 32">
+            <a:extLst>
+              <a:ext uri="{FF2B5EF4-FFF2-40B4-BE49-F238E27FC236}">
+                <a16:creationId xmlns:a16="http://schemas.microsoft.com/office/drawing/2014/main" id="{8C0F2E1E-04D7-33AB-071D-5871F948F6C0}"/>
+              </a:ext>
+            </a:extLst>
+          </p:cNvPr>
+          <p:cNvSpPr txBox="1"/>
+          <p:nvPr/>
+        </p:nvSpPr>
+        <p:spPr>
+          <a:xfrm rot="21204723">
+            <a:off x="3680535" y="4329445"/>
+            <a:ext cx="612668" cy="261610"/>
+          </a:xfrm>
+          <a:prstGeom prst="rect">
+            <a:avLst/>
+          </a:prstGeom>
+          <a:noFill/>
+        </p:spPr>
+        <p:txBody>
+          <a:bodyPr wrap="none" rtlCol="0">
+            <a:spAutoFit/>
+          </a:bodyPr>
+          <a:lstStyle/>
+          <a:p>
+            <a:r>
+              <a:rPr lang="pt-BR" sz="1100" dirty="0" err="1"/>
+              <a:t>Binding</a:t>
+            </a:r>
+            <a:endParaRPr lang="pt-BR" sz="1100" dirty="0"/>
+          </a:p>
+        </p:txBody>
+      </p:sp>
+    </p:spTree>
+    <p:extLst>
+      <p:ext uri="{BB962C8B-B14F-4D97-AF65-F5344CB8AC3E}">
+        <p14:creationId xmlns:p14="http://schemas.microsoft.com/office/powerpoint/2010/main" val="2807392377"/>
+      </p:ext>
+    </p:extLst>
+  </p:cSld>
+  <p:clrMapOvr>
+    <a:masterClrMapping/>
+  </p:clrMapOvr>
+</p:sld>
+</file>
+
 <file path=ppt/theme/theme1.xml><?xml version="1.0" encoding="utf-8"?>
 <a:theme xmlns:a="http://schemas.openxmlformats.org/drawingml/2006/main" name="Tema do Office">
   <a:themeElements>

</xml_diff>

<commit_message>
Adicionando camada view model
</commit_message>
<xml_diff>
--- a/edu/prototipos/presentation.pptx
+++ b/edu/prototipos/presentation.pptx
@@ -6,9 +6,11 @@
   </p:sldMasterIdLst>
   <p:sldIdLst>
     <p:sldId id="256" r:id="rId2"/>
-    <p:sldId id="257" r:id="rId3"/>
-    <p:sldId id="258" r:id="rId4"/>
-    <p:sldId id="259" r:id="rId5"/>
+    <p:sldId id="260" r:id="rId3"/>
+    <p:sldId id="257" r:id="rId4"/>
+    <p:sldId id="261" r:id="rId5"/>
+    <p:sldId id="258" r:id="rId6"/>
+    <p:sldId id="259" r:id="rId7"/>
   </p:sldIdLst>
   <p:sldSz cx="12192000" cy="6858000"/>
   <p:notesSz cx="6858000" cy="9144000"/>
@@ -262,7 +264,7 @@
           <a:p>
             <a:fld id="{25DDC539-B3D2-43E1-A8F9-EB2DD790F4D0}" type="datetimeFigureOut">
               <a:rPr lang="pt-BR" smtClean="0"/>
-              <a:t>18/08/2022</a:t>
+              <a:t>22/08/2022</a:t>
             </a:fld>
             <a:endParaRPr lang="pt-BR"/>
           </a:p>
@@ -460,7 +462,7 @@
           <a:p>
             <a:fld id="{25DDC539-B3D2-43E1-A8F9-EB2DD790F4D0}" type="datetimeFigureOut">
               <a:rPr lang="pt-BR" smtClean="0"/>
-              <a:t>18/08/2022</a:t>
+              <a:t>22/08/2022</a:t>
             </a:fld>
             <a:endParaRPr lang="pt-BR"/>
           </a:p>
@@ -668,7 +670,7 @@
           <a:p>
             <a:fld id="{25DDC539-B3D2-43E1-A8F9-EB2DD790F4D0}" type="datetimeFigureOut">
               <a:rPr lang="pt-BR" smtClean="0"/>
-              <a:t>18/08/2022</a:t>
+              <a:t>22/08/2022</a:t>
             </a:fld>
             <a:endParaRPr lang="pt-BR"/>
           </a:p>
@@ -866,7 +868,7 @@
           <a:p>
             <a:fld id="{25DDC539-B3D2-43E1-A8F9-EB2DD790F4D0}" type="datetimeFigureOut">
               <a:rPr lang="pt-BR" smtClean="0"/>
-              <a:t>18/08/2022</a:t>
+              <a:t>22/08/2022</a:t>
             </a:fld>
             <a:endParaRPr lang="pt-BR"/>
           </a:p>
@@ -1141,7 +1143,7 @@
           <a:p>
             <a:fld id="{25DDC539-B3D2-43E1-A8F9-EB2DD790F4D0}" type="datetimeFigureOut">
               <a:rPr lang="pt-BR" smtClean="0"/>
-              <a:t>18/08/2022</a:t>
+              <a:t>22/08/2022</a:t>
             </a:fld>
             <a:endParaRPr lang="pt-BR"/>
           </a:p>
@@ -1406,7 +1408,7 @@
           <a:p>
             <a:fld id="{25DDC539-B3D2-43E1-A8F9-EB2DD790F4D0}" type="datetimeFigureOut">
               <a:rPr lang="pt-BR" smtClean="0"/>
-              <a:t>18/08/2022</a:t>
+              <a:t>22/08/2022</a:t>
             </a:fld>
             <a:endParaRPr lang="pt-BR"/>
           </a:p>
@@ -1818,7 +1820,7 @@
           <a:p>
             <a:fld id="{25DDC539-B3D2-43E1-A8F9-EB2DD790F4D0}" type="datetimeFigureOut">
               <a:rPr lang="pt-BR" smtClean="0"/>
-              <a:t>18/08/2022</a:t>
+              <a:t>22/08/2022</a:t>
             </a:fld>
             <a:endParaRPr lang="pt-BR"/>
           </a:p>
@@ -1959,7 +1961,7 @@
           <a:p>
             <a:fld id="{25DDC539-B3D2-43E1-A8F9-EB2DD790F4D0}" type="datetimeFigureOut">
               <a:rPr lang="pt-BR" smtClean="0"/>
-              <a:t>18/08/2022</a:t>
+              <a:t>22/08/2022</a:t>
             </a:fld>
             <a:endParaRPr lang="pt-BR"/>
           </a:p>
@@ -2072,7 +2074,7 @@
           <a:p>
             <a:fld id="{25DDC539-B3D2-43E1-A8F9-EB2DD790F4D0}" type="datetimeFigureOut">
               <a:rPr lang="pt-BR" smtClean="0"/>
-              <a:t>18/08/2022</a:t>
+              <a:t>22/08/2022</a:t>
             </a:fld>
             <a:endParaRPr lang="pt-BR"/>
           </a:p>
@@ -2383,7 +2385,7 @@
           <a:p>
             <a:fld id="{25DDC539-B3D2-43E1-A8F9-EB2DD790F4D0}" type="datetimeFigureOut">
               <a:rPr lang="pt-BR" smtClean="0"/>
-              <a:t>18/08/2022</a:t>
+              <a:t>22/08/2022</a:t>
             </a:fld>
             <a:endParaRPr lang="pt-BR"/>
           </a:p>
@@ -2671,7 +2673,7 @@
           <a:p>
             <a:fld id="{25DDC539-B3D2-43E1-A8F9-EB2DD790F4D0}" type="datetimeFigureOut">
               <a:rPr lang="pt-BR" smtClean="0"/>
-              <a:t>18/08/2022</a:t>
+              <a:t>22/08/2022</a:t>
             </a:fld>
             <a:endParaRPr lang="pt-BR"/>
           </a:p>
@@ -2912,7 +2914,7 @@
           <a:p>
             <a:fld id="{25DDC539-B3D2-43E1-A8F9-EB2DD790F4D0}" type="datetimeFigureOut">
               <a:rPr lang="pt-BR" smtClean="0"/>
-              <a:t>18/08/2022</a:t>
+              <a:t>22/08/2022</a:t>
             </a:fld>
             <a:endParaRPr lang="pt-BR"/>
           </a:p>
@@ -3344,7 +3346,7 @@
           <p:nvPr>
             <p:extLst>
               <p:ext uri="{D42A27DB-BD31-4B8C-83A1-F6EECF244321}">
-                <p14:modId xmlns:p14="http://schemas.microsoft.com/office/powerpoint/2010/main" val="3202557968"/>
+                <p14:modId xmlns:p14="http://schemas.microsoft.com/office/powerpoint/2010/main" val="3485744283"/>
               </p:ext>
             </p:extLst>
           </p:nvPr>
@@ -3381,7 +3383,10 @@
                     <a:bodyPr/>
                     <a:lstStyle/>
                     <a:p>
-                      <a:endParaRPr lang="pt-BR"/>
+                      <a:r>
+                        <a:rPr lang="pt-BR" dirty="0"/>
+                        <a:t>0,0</a:t>
+                      </a:r>
                     </a:p>
                   </a:txBody>
                   <a:tcPr/>
@@ -3391,7 +3396,10 @@
                     <a:bodyPr/>
                     <a:lstStyle/>
                     <a:p>
-                      <a:endParaRPr lang="pt-BR"/>
+                      <a:r>
+                        <a:rPr lang="pt-BR" dirty="0"/>
+                        <a:t>0,1</a:t>
+                      </a:r>
                     </a:p>
                   </a:txBody>
                   <a:tcPr/>
@@ -3408,7 +3416,10 @@
                     <a:bodyPr/>
                     <a:lstStyle/>
                     <a:p>
-                      <a:endParaRPr lang="pt-BR"/>
+                      <a:r>
+                        <a:rPr lang="pt-BR" dirty="0"/>
+                        <a:t>1,0</a:t>
+                      </a:r>
                     </a:p>
                   </a:txBody>
                   <a:tcPr/>
@@ -3418,7 +3429,10 @@
                     <a:bodyPr/>
                     <a:lstStyle/>
                     <a:p>
-                      <a:endParaRPr lang="pt-BR" dirty="0"/>
+                      <a:r>
+                        <a:rPr lang="pt-BR" dirty="0"/>
+                        <a:t>1,1</a:t>
+                      </a:r>
                     </a:p>
                   </a:txBody>
                   <a:tcPr/>
@@ -3448,7 +3462,7 @@
           <p:nvPr>
             <p:extLst>
               <p:ext uri="{D42A27DB-BD31-4B8C-83A1-F6EECF244321}">
-                <p14:modId xmlns:p14="http://schemas.microsoft.com/office/powerpoint/2010/main" val="527709572"/>
+                <p14:modId xmlns:p14="http://schemas.microsoft.com/office/powerpoint/2010/main" val="1810347941"/>
               </p:ext>
             </p:extLst>
           </p:nvPr>
@@ -3512,7 +3526,7 @@
                     <a:bodyPr/>
                     <a:lstStyle/>
                     <a:p>
-                      <a:endParaRPr lang="pt-BR"/>
+                      <a:endParaRPr lang="pt-BR" dirty="0"/>
                     </a:p>
                   </a:txBody>
                   <a:tcPr/>
@@ -3777,10 +3791,10 @@
       </p:grpSpPr>
       <p:graphicFrame>
         <p:nvGraphicFramePr>
-          <p:cNvPr id="2" name="Tabela 1">
-            <a:extLst>
-              <a:ext uri="{FF2B5EF4-FFF2-40B4-BE49-F238E27FC236}">
-                <a16:creationId xmlns:a16="http://schemas.microsoft.com/office/drawing/2014/main" id="{0CC982A5-FD1A-EB40-F5E0-175324C1A49C}"/>
+          <p:cNvPr id="3" name="Tabela 3">
+            <a:extLst>
+              <a:ext uri="{FF2B5EF4-FFF2-40B4-BE49-F238E27FC236}">
+                <a16:creationId xmlns:a16="http://schemas.microsoft.com/office/drawing/2014/main" id="{5A018667-155D-F971-8669-861907251424}"/>
               </a:ext>
             </a:extLst>
           </p:cNvPr>
@@ -3790,13 +3804,467 @@
           <p:nvPr>
             <p:extLst>
               <p:ext uri="{D42A27DB-BD31-4B8C-83A1-F6EECF244321}">
-                <p14:modId xmlns:p14="http://schemas.microsoft.com/office/powerpoint/2010/main" val="3995060071"/>
+                <p14:modId xmlns:p14="http://schemas.microsoft.com/office/powerpoint/2010/main" val="4144270001"/>
               </p:ext>
             </p:extLst>
           </p:nvPr>
         </p:nvGraphicFramePr>
         <p:xfrm>
-          <a:off x="897622" y="696286"/>
+          <a:off x="1597286" y="4347148"/>
+          <a:ext cx="8128000" cy="1345338"/>
+        </p:xfrm>
+        <a:graphic>
+          <a:graphicData uri="http://schemas.openxmlformats.org/drawingml/2006/table">
+            <a:tbl>
+              <a:tblPr firstRow="1" bandRow="1">
+                <a:tableStyleId>{5940675A-B579-460E-94D1-54222C63F5DA}</a:tableStyleId>
+              </a:tblPr>
+              <a:tblGrid>
+                <a:gridCol w="1016000">
+                  <a:extLst>
+                    <a:ext uri="{9D8B030D-6E8A-4147-A177-3AD203B41FA5}">
+                      <a16:colId xmlns:a16="http://schemas.microsoft.com/office/drawing/2014/main" val="2540762844"/>
+                    </a:ext>
+                  </a:extLst>
+                </a:gridCol>
+                <a:gridCol w="1016000">
+                  <a:extLst>
+                    <a:ext uri="{9D8B030D-6E8A-4147-A177-3AD203B41FA5}">
+                      <a16:colId xmlns:a16="http://schemas.microsoft.com/office/drawing/2014/main" val="1935783931"/>
+                    </a:ext>
+                  </a:extLst>
+                </a:gridCol>
+                <a:gridCol w="1016000">
+                  <a:extLst>
+                    <a:ext uri="{9D8B030D-6E8A-4147-A177-3AD203B41FA5}">
+                      <a16:colId xmlns:a16="http://schemas.microsoft.com/office/drawing/2014/main" val="2074594703"/>
+                    </a:ext>
+                  </a:extLst>
+                </a:gridCol>
+                <a:gridCol w="1016000">
+                  <a:extLst>
+                    <a:ext uri="{9D8B030D-6E8A-4147-A177-3AD203B41FA5}">
+                      <a16:colId xmlns:a16="http://schemas.microsoft.com/office/drawing/2014/main" val="3953415076"/>
+                    </a:ext>
+                  </a:extLst>
+                </a:gridCol>
+                <a:gridCol w="1016000">
+                  <a:extLst>
+                    <a:ext uri="{9D8B030D-6E8A-4147-A177-3AD203B41FA5}">
+                      <a16:colId xmlns:a16="http://schemas.microsoft.com/office/drawing/2014/main" val="3461128755"/>
+                    </a:ext>
+                  </a:extLst>
+                </a:gridCol>
+                <a:gridCol w="1016000">
+                  <a:extLst>
+                    <a:ext uri="{9D8B030D-6E8A-4147-A177-3AD203B41FA5}">
+                      <a16:colId xmlns:a16="http://schemas.microsoft.com/office/drawing/2014/main" val="3318819639"/>
+                    </a:ext>
+                  </a:extLst>
+                </a:gridCol>
+                <a:gridCol w="1016000">
+                  <a:extLst>
+                    <a:ext uri="{9D8B030D-6E8A-4147-A177-3AD203B41FA5}">
+                      <a16:colId xmlns:a16="http://schemas.microsoft.com/office/drawing/2014/main" val="3812353751"/>
+                    </a:ext>
+                  </a:extLst>
+                </a:gridCol>
+                <a:gridCol w="1016000">
+                  <a:extLst>
+                    <a:ext uri="{9D8B030D-6E8A-4147-A177-3AD203B41FA5}">
+                      <a16:colId xmlns:a16="http://schemas.microsoft.com/office/drawing/2014/main" val="987655979"/>
+                    </a:ext>
+                  </a:extLst>
+                </a:gridCol>
+              </a:tblGrid>
+              <a:tr h="1345338">
+                <a:tc>
+                  <a:txBody>
+                    <a:bodyPr/>
+                    <a:lstStyle/>
+                    <a:p>
+                      <a:endParaRPr lang="pt-BR" dirty="0"/>
+                    </a:p>
+                  </a:txBody>
+                  <a:tcPr/>
+                </a:tc>
+                <a:tc>
+                  <a:txBody>
+                    <a:bodyPr/>
+                    <a:lstStyle/>
+                    <a:p>
+                      <a:endParaRPr lang="pt-BR"/>
+                    </a:p>
+                  </a:txBody>
+                  <a:tcPr/>
+                </a:tc>
+                <a:tc>
+                  <a:txBody>
+                    <a:bodyPr/>
+                    <a:lstStyle/>
+                    <a:p>
+                      <a:endParaRPr lang="pt-BR" dirty="0"/>
+                    </a:p>
+                  </a:txBody>
+                  <a:tcPr/>
+                </a:tc>
+                <a:tc>
+                  <a:txBody>
+                    <a:bodyPr/>
+                    <a:lstStyle/>
+                    <a:p>
+                      <a:endParaRPr lang="pt-BR"/>
+                    </a:p>
+                  </a:txBody>
+                  <a:tcPr/>
+                </a:tc>
+                <a:tc>
+                  <a:txBody>
+                    <a:bodyPr/>
+                    <a:lstStyle/>
+                    <a:p>
+                      <a:endParaRPr lang="pt-BR"/>
+                    </a:p>
+                  </a:txBody>
+                  <a:tcPr/>
+                </a:tc>
+                <a:tc>
+                  <a:txBody>
+                    <a:bodyPr/>
+                    <a:lstStyle/>
+                    <a:p>
+                      <a:endParaRPr lang="pt-BR"/>
+                    </a:p>
+                  </a:txBody>
+                  <a:tcPr/>
+                </a:tc>
+                <a:tc>
+                  <a:txBody>
+                    <a:bodyPr/>
+                    <a:lstStyle/>
+                    <a:p>
+                      <a:endParaRPr lang="pt-BR"/>
+                    </a:p>
+                  </a:txBody>
+                  <a:tcPr/>
+                </a:tc>
+                <a:tc>
+                  <a:txBody>
+                    <a:bodyPr/>
+                    <a:lstStyle/>
+                    <a:p>
+                      <a:endParaRPr lang="pt-BR" dirty="0"/>
+                    </a:p>
+                  </a:txBody>
+                  <a:tcPr/>
+                </a:tc>
+                <a:extLst>
+                  <a:ext uri="{0D108BD9-81ED-4DB2-BD59-A6C34878D82A}">
+                    <a16:rowId xmlns:a16="http://schemas.microsoft.com/office/drawing/2014/main" val="1293639581"/>
+                  </a:ext>
+                </a:extLst>
+              </a:tr>
+            </a:tbl>
+          </a:graphicData>
+        </a:graphic>
+      </p:graphicFrame>
+      <p:graphicFrame>
+        <p:nvGraphicFramePr>
+          <p:cNvPr id="4" name="Tabela 4">
+            <a:extLst>
+              <a:ext uri="{FF2B5EF4-FFF2-40B4-BE49-F238E27FC236}">
+                <a16:creationId xmlns:a16="http://schemas.microsoft.com/office/drawing/2014/main" id="{DD7892F8-A22E-BE58-5F30-3E7B5C631684}"/>
+              </a:ext>
+            </a:extLst>
+          </p:cNvPr>
+          <p:cNvGraphicFramePr>
+            <a:graphicFrameLocks noGrp="1"/>
+          </p:cNvGraphicFramePr>
+          <p:nvPr>
+            <p:extLst>
+              <p:ext uri="{D42A27DB-BD31-4B8C-83A1-F6EECF244321}">
+                <p14:modId xmlns:p14="http://schemas.microsoft.com/office/powerpoint/2010/main" val="796529508"/>
+              </p:ext>
+            </p:extLst>
+          </p:nvPr>
+        </p:nvGraphicFramePr>
+        <p:xfrm>
+          <a:off x="1807148" y="936162"/>
+          <a:ext cx="8127999" cy="2492838"/>
+        </p:xfrm>
+        <a:graphic>
+          <a:graphicData uri="http://schemas.openxmlformats.org/drawingml/2006/table">
+            <a:tbl>
+              <a:tblPr firstRow="1" bandRow="1">
+                <a:tableStyleId>{5940675A-B579-460E-94D1-54222C63F5DA}</a:tableStyleId>
+              </a:tblPr>
+              <a:tblGrid>
+                <a:gridCol w="2709333">
+                  <a:extLst>
+                    <a:ext uri="{9D8B030D-6E8A-4147-A177-3AD203B41FA5}">
+                      <a16:colId xmlns:a16="http://schemas.microsoft.com/office/drawing/2014/main" val="196274106"/>
+                    </a:ext>
+                  </a:extLst>
+                </a:gridCol>
+                <a:gridCol w="2709333">
+                  <a:extLst>
+                    <a:ext uri="{9D8B030D-6E8A-4147-A177-3AD203B41FA5}">
+                      <a16:colId xmlns:a16="http://schemas.microsoft.com/office/drawing/2014/main" val="4026262985"/>
+                    </a:ext>
+                  </a:extLst>
+                </a:gridCol>
+                <a:gridCol w="2709333">
+                  <a:extLst>
+                    <a:ext uri="{9D8B030D-6E8A-4147-A177-3AD203B41FA5}">
+                      <a16:colId xmlns:a16="http://schemas.microsoft.com/office/drawing/2014/main" val="3381968562"/>
+                    </a:ext>
+                  </a:extLst>
+                </a:gridCol>
+              </a:tblGrid>
+              <a:tr h="2492838">
+                <a:tc>
+                  <a:txBody>
+                    <a:bodyPr/>
+                    <a:lstStyle/>
+                    <a:p>
+                      <a:endParaRPr lang="pt-BR" dirty="0"/>
+                    </a:p>
+                  </a:txBody>
+                  <a:tcPr/>
+                </a:tc>
+                <a:tc>
+                  <a:txBody>
+                    <a:bodyPr/>
+                    <a:lstStyle/>
+                    <a:p>
+                      <a:r>
+                        <a:rPr lang="pt-BR" dirty="0"/>
+                        <a:t>2</a:t>
+                      </a:r>
+                    </a:p>
+                  </a:txBody>
+                  <a:tcPr/>
+                </a:tc>
+                <a:tc>
+                  <a:txBody>
+                    <a:bodyPr/>
+                    <a:lstStyle/>
+                    <a:p>
+                      <a:r>
+                        <a:rPr lang="pt-BR" dirty="0"/>
+                        <a:t>3</a:t>
+                      </a:r>
+                    </a:p>
+                  </a:txBody>
+                  <a:tcPr/>
+                </a:tc>
+                <a:extLst>
+                  <a:ext uri="{0D108BD9-81ED-4DB2-BD59-A6C34878D82A}">
+                    <a16:rowId xmlns:a16="http://schemas.microsoft.com/office/drawing/2014/main" val="3460795025"/>
+                  </a:ext>
+                </a:extLst>
+              </a:tr>
+            </a:tbl>
+          </a:graphicData>
+        </a:graphic>
+      </p:graphicFrame>
+      <p:graphicFrame>
+        <p:nvGraphicFramePr>
+          <p:cNvPr id="5" name="Tabela 2">
+            <a:extLst>
+              <a:ext uri="{FF2B5EF4-FFF2-40B4-BE49-F238E27FC236}">
+                <a16:creationId xmlns:a16="http://schemas.microsoft.com/office/drawing/2014/main" id="{0C6DE911-CD1A-C1D2-72C7-6134019A9C59}"/>
+              </a:ext>
+            </a:extLst>
+          </p:cNvPr>
+          <p:cNvGraphicFramePr>
+            <a:graphicFrameLocks noGrp="1"/>
+          </p:cNvGraphicFramePr>
+          <p:nvPr>
+            <p:extLst>
+              <p:ext uri="{D42A27DB-BD31-4B8C-83A1-F6EECF244321}">
+                <p14:modId xmlns:p14="http://schemas.microsoft.com/office/powerpoint/2010/main" val="310381773"/>
+              </p:ext>
+            </p:extLst>
+          </p:nvPr>
+        </p:nvGraphicFramePr>
+        <p:xfrm>
+          <a:off x="1912079" y="1070061"/>
+          <a:ext cx="2465049" cy="2225040"/>
+        </p:xfrm>
+        <a:graphic>
+          <a:graphicData uri="http://schemas.openxmlformats.org/drawingml/2006/table">
+            <a:tbl>
+              <a:tblPr firstRow="1" bandRow="1">
+                <a:tableStyleId>{5940675A-B579-460E-94D1-54222C63F5DA}</a:tableStyleId>
+              </a:tblPr>
+              <a:tblGrid>
+                <a:gridCol w="2465049">
+                  <a:extLst>
+                    <a:ext uri="{9D8B030D-6E8A-4147-A177-3AD203B41FA5}">
+                      <a16:colId xmlns:a16="http://schemas.microsoft.com/office/drawing/2014/main" val="3063530318"/>
+                    </a:ext>
+                  </a:extLst>
+                </a:gridCol>
+              </a:tblGrid>
+              <a:tr h="370840">
+                <a:tc>
+                  <a:txBody>
+                    <a:bodyPr/>
+                    <a:lstStyle/>
+                    <a:p>
+                      <a:endParaRPr lang="pt-BR" dirty="0"/>
+                    </a:p>
+                  </a:txBody>
+                  <a:tcPr/>
+                </a:tc>
+                <a:extLst>
+                  <a:ext uri="{0D108BD9-81ED-4DB2-BD59-A6C34878D82A}">
+                    <a16:rowId xmlns:a16="http://schemas.microsoft.com/office/drawing/2014/main" val="888658244"/>
+                  </a:ext>
+                </a:extLst>
+              </a:tr>
+              <a:tr h="370840">
+                <a:tc>
+                  <a:txBody>
+                    <a:bodyPr/>
+                    <a:lstStyle/>
+                    <a:p>
+                      <a:endParaRPr lang="pt-BR" dirty="0"/>
+                    </a:p>
+                  </a:txBody>
+                  <a:tcPr/>
+                </a:tc>
+                <a:extLst>
+                  <a:ext uri="{0D108BD9-81ED-4DB2-BD59-A6C34878D82A}">
+                    <a16:rowId xmlns:a16="http://schemas.microsoft.com/office/drawing/2014/main" val="961875876"/>
+                  </a:ext>
+                </a:extLst>
+              </a:tr>
+              <a:tr h="370840">
+                <a:tc>
+                  <a:txBody>
+                    <a:bodyPr/>
+                    <a:lstStyle/>
+                    <a:p>
+                      <a:endParaRPr lang="pt-BR"/>
+                    </a:p>
+                  </a:txBody>
+                  <a:tcPr/>
+                </a:tc>
+                <a:extLst>
+                  <a:ext uri="{0D108BD9-81ED-4DB2-BD59-A6C34878D82A}">
+                    <a16:rowId xmlns:a16="http://schemas.microsoft.com/office/drawing/2014/main" val="4076754466"/>
+                  </a:ext>
+                </a:extLst>
+              </a:tr>
+              <a:tr h="370840">
+                <a:tc>
+                  <a:txBody>
+                    <a:bodyPr/>
+                    <a:lstStyle/>
+                    <a:p>
+                      <a:endParaRPr lang="pt-BR"/>
+                    </a:p>
+                  </a:txBody>
+                  <a:tcPr/>
+                </a:tc>
+                <a:extLst>
+                  <a:ext uri="{0D108BD9-81ED-4DB2-BD59-A6C34878D82A}">
+                    <a16:rowId xmlns:a16="http://schemas.microsoft.com/office/drawing/2014/main" val="4207988895"/>
+                  </a:ext>
+                </a:extLst>
+              </a:tr>
+              <a:tr h="370840">
+                <a:tc>
+                  <a:txBody>
+                    <a:bodyPr/>
+                    <a:lstStyle/>
+                    <a:p>
+                      <a:endParaRPr lang="pt-BR" dirty="0"/>
+                    </a:p>
+                  </a:txBody>
+                  <a:tcPr/>
+                </a:tc>
+                <a:extLst>
+                  <a:ext uri="{0D108BD9-81ED-4DB2-BD59-A6C34878D82A}">
+                    <a16:rowId xmlns:a16="http://schemas.microsoft.com/office/drawing/2014/main" val="3629990679"/>
+                  </a:ext>
+                </a:extLst>
+              </a:tr>
+              <a:tr h="370840">
+                <a:tc>
+                  <a:txBody>
+                    <a:bodyPr/>
+                    <a:lstStyle/>
+                    <a:p>
+                      <a:endParaRPr lang="pt-BR" dirty="0"/>
+                    </a:p>
+                  </a:txBody>
+                  <a:tcPr/>
+                </a:tc>
+                <a:extLst>
+                  <a:ext uri="{0D108BD9-81ED-4DB2-BD59-A6C34878D82A}">
+                    <a16:rowId xmlns:a16="http://schemas.microsoft.com/office/drawing/2014/main" val="1217660564"/>
+                  </a:ext>
+                </a:extLst>
+              </a:tr>
+            </a:tbl>
+          </a:graphicData>
+        </a:graphic>
+      </p:graphicFrame>
+    </p:spTree>
+    <p:extLst>
+      <p:ext uri="{BB962C8B-B14F-4D97-AF65-F5344CB8AC3E}">
+        <p14:creationId xmlns:p14="http://schemas.microsoft.com/office/powerpoint/2010/main" val="2542510108"/>
+      </p:ext>
+    </p:extLst>
+  </p:cSld>
+  <p:clrMapOvr>
+    <a:masterClrMapping/>
+  </p:clrMapOvr>
+</p:sld>
+</file>
+
+<file path=ppt/slides/slide3.xml><?xml version="1.0" encoding="utf-8"?>
+<p:sld xmlns:a="http://schemas.openxmlformats.org/drawingml/2006/main" xmlns:r="http://schemas.openxmlformats.org/officeDocument/2006/relationships" xmlns:p="http://schemas.openxmlformats.org/presentationml/2006/main">
+  <p:cSld>
+    <p:spTree>
+      <p:nvGrpSpPr>
+        <p:cNvPr id="1" name=""/>
+        <p:cNvGrpSpPr/>
+        <p:nvPr/>
+      </p:nvGrpSpPr>
+      <p:grpSpPr>
+        <a:xfrm>
+          <a:off x="0" y="0"/>
+          <a:ext cx="0" cy="0"/>
+          <a:chOff x="0" y="0"/>
+          <a:chExt cx="0" cy="0"/>
+        </a:xfrm>
+      </p:grpSpPr>
+      <p:graphicFrame>
+        <p:nvGraphicFramePr>
+          <p:cNvPr id="2" name="Tabela 1">
+            <a:extLst>
+              <a:ext uri="{FF2B5EF4-FFF2-40B4-BE49-F238E27FC236}">
+                <a16:creationId xmlns:a16="http://schemas.microsoft.com/office/drawing/2014/main" id="{0CC982A5-FD1A-EB40-F5E0-175324C1A49C}"/>
+              </a:ext>
+            </a:extLst>
+          </p:cNvPr>
+          <p:cNvGraphicFramePr>
+            <a:graphicFrameLocks noGrp="1"/>
+          </p:cNvGraphicFramePr>
+          <p:nvPr>
+            <p:extLst>
+              <p:ext uri="{D42A27DB-BD31-4B8C-83A1-F6EECF244321}">
+                <p14:modId xmlns:p14="http://schemas.microsoft.com/office/powerpoint/2010/main" val="255519927"/>
+              </p:ext>
+            </p:extLst>
+          </p:nvPr>
+        </p:nvGraphicFramePr>
+        <p:xfrm>
+          <a:off x="1006541" y="715161"/>
           <a:ext cx="10544961" cy="5427677"/>
         </p:xfrm>
         <a:graphic>
@@ -3950,10 +4418,871 @@
           <p:nvPr>
             <p:extLst>
               <p:ext uri="{D42A27DB-BD31-4B8C-83A1-F6EECF244321}">
-                <p14:modId xmlns:p14="http://schemas.microsoft.com/office/powerpoint/2010/main" val="545645427"/>
+                <p14:modId xmlns:p14="http://schemas.microsoft.com/office/powerpoint/2010/main" val="1344411169"/>
               </p:ext>
             </p:extLst>
           </p:nvPr>
+        </p:nvGraphicFramePr>
+        <p:xfrm>
+          <a:off x="1149292" y="3184981"/>
+          <a:ext cx="2021747" cy="2518485"/>
+        </p:xfrm>
+        <a:graphic>
+          <a:graphicData uri="http://schemas.openxmlformats.org/drawingml/2006/table">
+            <a:tbl>
+              <a:tblPr firstRow="1" bandRow="1">
+                <a:tableStyleId>{616DA210-FB5B-4158-B5E0-FEB733F419BA}</a:tableStyleId>
+              </a:tblPr>
+              <a:tblGrid>
+                <a:gridCol w="2021747">
+                  <a:extLst>
+                    <a:ext uri="{9D8B030D-6E8A-4147-A177-3AD203B41FA5}">
+                      <a16:colId xmlns:a16="http://schemas.microsoft.com/office/drawing/2014/main" val="1341360146"/>
+                    </a:ext>
+                  </a:extLst>
+                </a:gridCol>
+              </a:tblGrid>
+              <a:tr h="503697">
+                <a:tc>
+                  <a:txBody>
+                    <a:bodyPr/>
+                    <a:lstStyle/>
+                    <a:p>
+                      <a:r>
+                        <a:rPr lang="pt-BR" dirty="0"/>
+                        <a:t>Fulano de tal</a:t>
+                      </a:r>
+                    </a:p>
+                  </a:txBody>
+                  <a:tcPr>
+                    <a:solidFill>
+                      <a:schemeClr val="accent2"/>
+                    </a:solidFill>
+                  </a:tcPr>
+                </a:tc>
+                <a:extLst>
+                  <a:ext uri="{0D108BD9-81ED-4DB2-BD59-A6C34878D82A}">
+                    <a16:rowId xmlns:a16="http://schemas.microsoft.com/office/drawing/2014/main" val="2299771233"/>
+                  </a:ext>
+                </a:extLst>
+              </a:tr>
+              <a:tr h="503697">
+                <a:tc>
+                  <a:txBody>
+                    <a:bodyPr/>
+                    <a:lstStyle/>
+                    <a:p>
+                      <a:endParaRPr lang="pt-BR"/>
+                    </a:p>
+                  </a:txBody>
+                  <a:tcPr>
+                    <a:solidFill>
+                      <a:schemeClr val="accent2"/>
+                    </a:solidFill>
+                  </a:tcPr>
+                </a:tc>
+                <a:extLst>
+                  <a:ext uri="{0D108BD9-81ED-4DB2-BD59-A6C34878D82A}">
+                    <a16:rowId xmlns:a16="http://schemas.microsoft.com/office/drawing/2014/main" val="3339325882"/>
+                  </a:ext>
+                </a:extLst>
+              </a:tr>
+              <a:tr h="503697">
+                <a:tc>
+                  <a:txBody>
+                    <a:bodyPr/>
+                    <a:lstStyle/>
+                    <a:p>
+                      <a:endParaRPr lang="pt-BR"/>
+                    </a:p>
+                  </a:txBody>
+                  <a:tcPr>
+                    <a:solidFill>
+                      <a:schemeClr val="accent2"/>
+                    </a:solidFill>
+                  </a:tcPr>
+                </a:tc>
+                <a:extLst>
+                  <a:ext uri="{0D108BD9-81ED-4DB2-BD59-A6C34878D82A}">
+                    <a16:rowId xmlns:a16="http://schemas.microsoft.com/office/drawing/2014/main" val="2284919013"/>
+                  </a:ext>
+                </a:extLst>
+              </a:tr>
+              <a:tr h="503697">
+                <a:tc>
+                  <a:txBody>
+                    <a:bodyPr/>
+                    <a:lstStyle/>
+                    <a:p>
+                      <a:endParaRPr lang="pt-BR"/>
+                    </a:p>
+                  </a:txBody>
+                  <a:tcPr>
+                    <a:solidFill>
+                      <a:schemeClr val="accent2"/>
+                    </a:solidFill>
+                  </a:tcPr>
+                </a:tc>
+                <a:extLst>
+                  <a:ext uri="{0D108BD9-81ED-4DB2-BD59-A6C34878D82A}">
+                    <a16:rowId xmlns:a16="http://schemas.microsoft.com/office/drawing/2014/main" val="2448836400"/>
+                  </a:ext>
+                </a:extLst>
+              </a:tr>
+              <a:tr h="503697">
+                <a:tc>
+                  <a:txBody>
+                    <a:bodyPr/>
+                    <a:lstStyle/>
+                    <a:p>
+                      <a:endParaRPr lang="pt-BR" dirty="0"/>
+                    </a:p>
+                  </a:txBody>
+                  <a:tcPr>
+                    <a:solidFill>
+                      <a:schemeClr val="accent2"/>
+                    </a:solidFill>
+                  </a:tcPr>
+                </a:tc>
+                <a:extLst>
+                  <a:ext uri="{0D108BD9-81ED-4DB2-BD59-A6C34878D82A}">
+                    <a16:rowId xmlns:a16="http://schemas.microsoft.com/office/drawing/2014/main" val="274389584"/>
+                  </a:ext>
+                </a:extLst>
+              </a:tr>
+            </a:tbl>
+          </a:graphicData>
+        </a:graphic>
+      </p:graphicFrame>
+      <p:sp>
+        <p:nvSpPr>
+          <p:cNvPr id="5" name="Retângulo 4">
+            <a:extLst>
+              <a:ext uri="{FF2B5EF4-FFF2-40B4-BE49-F238E27FC236}">
+                <a16:creationId xmlns:a16="http://schemas.microsoft.com/office/drawing/2014/main" id="{A4F73B25-AB6D-9359-DCB7-094AAE500E1C}"/>
+              </a:ext>
+            </a:extLst>
+          </p:cNvPr>
+          <p:cNvSpPr/>
+          <p:nvPr/>
+        </p:nvSpPr>
+        <p:spPr>
+          <a:xfrm>
+            <a:off x="3531765" y="2625754"/>
+            <a:ext cx="7636779" cy="3212984"/>
+          </a:xfrm>
+          <a:prstGeom prst="rect">
+            <a:avLst/>
+          </a:prstGeom>
+          <a:noFill/>
+          <a:ln>
+            <a:solidFill>
+              <a:schemeClr val="tx1"/>
+            </a:solidFill>
+          </a:ln>
+        </p:spPr>
+        <p:style>
+          <a:lnRef idx="2">
+            <a:schemeClr val="accent1">
+              <a:shade val="50000"/>
+            </a:schemeClr>
+          </a:lnRef>
+          <a:fillRef idx="1">
+            <a:schemeClr val="accent1"/>
+          </a:fillRef>
+          <a:effectRef idx="0">
+            <a:schemeClr val="accent1"/>
+          </a:effectRef>
+          <a:fontRef idx="minor">
+            <a:schemeClr val="lt1"/>
+          </a:fontRef>
+        </p:style>
+        <p:txBody>
+          <a:bodyPr rtlCol="0" anchor="ctr"/>
+          <a:lstStyle/>
+          <a:p>
+            <a:pPr algn="ctr"/>
+            <a:endParaRPr lang="pt-BR"/>
+          </a:p>
+        </p:txBody>
+      </p:sp>
+      <p:sp>
+        <p:nvSpPr>
+          <p:cNvPr id="6" name="Retângulo 5">
+            <a:extLst>
+              <a:ext uri="{FF2B5EF4-FFF2-40B4-BE49-F238E27FC236}">
+                <a16:creationId xmlns:a16="http://schemas.microsoft.com/office/drawing/2014/main" id="{FA55D8E6-7835-F074-E46E-6122220A47DB}"/>
+              </a:ext>
+            </a:extLst>
+          </p:cNvPr>
+          <p:cNvSpPr/>
+          <p:nvPr/>
+        </p:nvSpPr>
+        <p:spPr>
+          <a:xfrm>
+            <a:off x="3875714" y="2894202"/>
+            <a:ext cx="6686025" cy="402671"/>
+          </a:xfrm>
+          <a:prstGeom prst="rect">
+            <a:avLst/>
+          </a:prstGeom>
+          <a:noFill/>
+          <a:ln>
+            <a:solidFill>
+              <a:schemeClr val="tx1"/>
+            </a:solidFill>
+          </a:ln>
+        </p:spPr>
+        <p:style>
+          <a:lnRef idx="2">
+            <a:schemeClr val="accent1">
+              <a:shade val="50000"/>
+            </a:schemeClr>
+          </a:lnRef>
+          <a:fillRef idx="1">
+            <a:schemeClr val="accent1"/>
+          </a:fillRef>
+          <a:effectRef idx="0">
+            <a:schemeClr val="accent1"/>
+          </a:effectRef>
+          <a:fontRef idx="minor">
+            <a:schemeClr val="lt1"/>
+          </a:fontRef>
+        </p:style>
+        <p:txBody>
+          <a:bodyPr rtlCol="0" anchor="ctr"/>
+          <a:lstStyle/>
+          <a:p>
+            <a:pPr algn="ctr"/>
+            <a:r>
+              <a:rPr lang="pt-BR" dirty="0">
+                <a:solidFill>
+                  <a:schemeClr val="tx1"/>
+                </a:solidFill>
+              </a:rPr>
+              <a:t>Beltrano de tal</a:t>
+            </a:r>
+          </a:p>
+        </p:txBody>
+      </p:sp>
+      <p:sp>
+        <p:nvSpPr>
+          <p:cNvPr id="7" name="Retângulo 6">
+            <a:extLst>
+              <a:ext uri="{FF2B5EF4-FFF2-40B4-BE49-F238E27FC236}">
+                <a16:creationId xmlns:a16="http://schemas.microsoft.com/office/drawing/2014/main" id="{0C74731C-4A2B-6201-35DE-EDE45065AB30}"/>
+              </a:ext>
+            </a:extLst>
+          </p:cNvPr>
+          <p:cNvSpPr/>
+          <p:nvPr/>
+        </p:nvSpPr>
+        <p:spPr>
+          <a:xfrm>
+            <a:off x="3875715" y="3429000"/>
+            <a:ext cx="3473042" cy="402671"/>
+          </a:xfrm>
+          <a:prstGeom prst="rect">
+            <a:avLst/>
+          </a:prstGeom>
+          <a:noFill/>
+          <a:ln>
+            <a:solidFill>
+              <a:schemeClr val="tx1"/>
+            </a:solidFill>
+          </a:ln>
+        </p:spPr>
+        <p:style>
+          <a:lnRef idx="2">
+            <a:schemeClr val="accent1">
+              <a:shade val="50000"/>
+            </a:schemeClr>
+          </a:lnRef>
+          <a:fillRef idx="1">
+            <a:schemeClr val="accent1"/>
+          </a:fillRef>
+          <a:effectRef idx="0">
+            <a:schemeClr val="accent1"/>
+          </a:effectRef>
+          <a:fontRef idx="minor">
+            <a:schemeClr val="lt1"/>
+          </a:fontRef>
+        </p:style>
+        <p:txBody>
+          <a:bodyPr rtlCol="0" anchor="ctr"/>
+          <a:lstStyle/>
+          <a:p>
+            <a:pPr algn="ctr"/>
+            <a:endParaRPr lang="pt-BR"/>
+          </a:p>
+        </p:txBody>
+      </p:sp>
+      <p:sp>
+        <p:nvSpPr>
+          <p:cNvPr id="8" name="Retângulo 7">
+            <a:extLst>
+              <a:ext uri="{FF2B5EF4-FFF2-40B4-BE49-F238E27FC236}">
+                <a16:creationId xmlns:a16="http://schemas.microsoft.com/office/drawing/2014/main" id="{8EEA3D57-DD95-276D-43EB-03BC4E94A743}"/>
+              </a:ext>
+            </a:extLst>
+          </p:cNvPr>
+          <p:cNvSpPr/>
+          <p:nvPr/>
+        </p:nvSpPr>
+        <p:spPr>
+          <a:xfrm>
+            <a:off x="3875714" y="3963798"/>
+            <a:ext cx="3473042" cy="402671"/>
+          </a:xfrm>
+          <a:prstGeom prst="rect">
+            <a:avLst/>
+          </a:prstGeom>
+          <a:solidFill>
+            <a:srgbClr val="002060"/>
+          </a:solidFill>
+          <a:ln>
+            <a:solidFill>
+              <a:schemeClr val="tx1"/>
+            </a:solidFill>
+          </a:ln>
+        </p:spPr>
+        <p:style>
+          <a:lnRef idx="2">
+            <a:schemeClr val="accent1">
+              <a:shade val="50000"/>
+            </a:schemeClr>
+          </a:lnRef>
+          <a:fillRef idx="1">
+            <a:schemeClr val="accent1"/>
+          </a:fillRef>
+          <a:effectRef idx="0">
+            <a:schemeClr val="accent1"/>
+          </a:effectRef>
+          <a:fontRef idx="minor">
+            <a:schemeClr val="lt1"/>
+          </a:fontRef>
+        </p:style>
+        <p:txBody>
+          <a:bodyPr rtlCol="0" anchor="ctr"/>
+          <a:lstStyle/>
+          <a:p>
+            <a:pPr algn="ctr"/>
+            <a:r>
+              <a:rPr lang="pt-BR" dirty="0"/>
+              <a:t>Cargos</a:t>
+            </a:r>
+          </a:p>
+        </p:txBody>
+      </p:sp>
+      <p:sp>
+        <p:nvSpPr>
+          <p:cNvPr id="9" name="Retângulo 8">
+            <a:extLst>
+              <a:ext uri="{FF2B5EF4-FFF2-40B4-BE49-F238E27FC236}">
+                <a16:creationId xmlns:a16="http://schemas.microsoft.com/office/drawing/2014/main" id="{45E50B8B-DD2C-B5BB-676B-B53E5CB2AA29}"/>
+              </a:ext>
+            </a:extLst>
+          </p:cNvPr>
+          <p:cNvSpPr/>
+          <p:nvPr/>
+        </p:nvSpPr>
+        <p:spPr>
+          <a:xfrm>
+            <a:off x="3875714" y="4498597"/>
+            <a:ext cx="4806892" cy="402671"/>
+          </a:xfrm>
+          <a:prstGeom prst="rect">
+            <a:avLst/>
+          </a:prstGeom>
+          <a:noFill/>
+          <a:ln>
+            <a:solidFill>
+              <a:schemeClr val="tx1"/>
+            </a:solidFill>
+          </a:ln>
+        </p:spPr>
+        <p:style>
+          <a:lnRef idx="2">
+            <a:schemeClr val="accent1">
+              <a:shade val="50000"/>
+            </a:schemeClr>
+          </a:lnRef>
+          <a:fillRef idx="1">
+            <a:schemeClr val="accent1"/>
+          </a:fillRef>
+          <a:effectRef idx="0">
+            <a:schemeClr val="accent1"/>
+          </a:effectRef>
+          <a:fontRef idx="minor">
+            <a:schemeClr val="lt1"/>
+          </a:fontRef>
+        </p:style>
+        <p:txBody>
+          <a:bodyPr rtlCol="0" anchor="ctr"/>
+          <a:lstStyle/>
+          <a:p>
+            <a:pPr algn="ctr"/>
+            <a:endParaRPr lang="pt-BR"/>
+          </a:p>
+        </p:txBody>
+      </p:sp>
+      <p:sp>
+        <p:nvSpPr>
+          <p:cNvPr id="10" name="Retângulo 9">
+            <a:extLst>
+              <a:ext uri="{FF2B5EF4-FFF2-40B4-BE49-F238E27FC236}">
+                <a16:creationId xmlns:a16="http://schemas.microsoft.com/office/drawing/2014/main" id="{B6A4FFBE-DF4C-2BB9-96A4-9538904F1BCB}"/>
+              </a:ext>
+            </a:extLst>
+          </p:cNvPr>
+          <p:cNvSpPr/>
+          <p:nvPr/>
+        </p:nvSpPr>
+        <p:spPr>
+          <a:xfrm>
+            <a:off x="9689284" y="5300795"/>
+            <a:ext cx="1213608" cy="402671"/>
+          </a:xfrm>
+          <a:prstGeom prst="rect">
+            <a:avLst/>
+          </a:prstGeom>
+          <a:noFill/>
+          <a:ln>
+            <a:solidFill>
+              <a:schemeClr val="tx1"/>
+            </a:solidFill>
+          </a:ln>
+        </p:spPr>
+        <p:style>
+          <a:lnRef idx="2">
+            <a:schemeClr val="accent1">
+              <a:shade val="50000"/>
+            </a:schemeClr>
+          </a:lnRef>
+          <a:fillRef idx="1">
+            <a:schemeClr val="accent1"/>
+          </a:fillRef>
+          <a:effectRef idx="0">
+            <a:schemeClr val="accent1"/>
+          </a:effectRef>
+          <a:fontRef idx="minor">
+            <a:schemeClr val="lt1"/>
+          </a:fontRef>
+        </p:style>
+        <p:txBody>
+          <a:bodyPr rtlCol="0" anchor="ctr"/>
+          <a:lstStyle/>
+          <a:p>
+            <a:pPr algn="ctr"/>
+            <a:endParaRPr lang="pt-BR"/>
+          </a:p>
+        </p:txBody>
+      </p:sp>
+      <p:sp>
+        <p:nvSpPr>
+          <p:cNvPr id="11" name="Retângulo 10">
+            <a:extLst>
+              <a:ext uri="{FF2B5EF4-FFF2-40B4-BE49-F238E27FC236}">
+                <a16:creationId xmlns:a16="http://schemas.microsoft.com/office/drawing/2014/main" id="{93C2323F-DAC4-BAA9-B179-84228AF289AB}"/>
+              </a:ext>
+            </a:extLst>
+          </p:cNvPr>
+          <p:cNvSpPr/>
+          <p:nvPr/>
+        </p:nvSpPr>
+        <p:spPr>
+          <a:xfrm>
+            <a:off x="6920917" y="3963798"/>
+            <a:ext cx="427840" cy="402671"/>
+          </a:xfrm>
+          <a:prstGeom prst="rect">
+            <a:avLst/>
+          </a:prstGeom>
+          <a:noFill/>
+          <a:ln>
+            <a:solidFill>
+              <a:schemeClr val="tx1"/>
+            </a:solidFill>
+          </a:ln>
+        </p:spPr>
+        <p:style>
+          <a:lnRef idx="2">
+            <a:schemeClr val="accent1">
+              <a:shade val="50000"/>
+            </a:schemeClr>
+          </a:lnRef>
+          <a:fillRef idx="1">
+            <a:schemeClr val="accent1"/>
+          </a:fillRef>
+          <a:effectRef idx="0">
+            <a:schemeClr val="accent1"/>
+          </a:effectRef>
+          <a:fontRef idx="minor">
+            <a:schemeClr val="lt1"/>
+          </a:fontRef>
+        </p:style>
+        <p:txBody>
+          <a:bodyPr rtlCol="0" anchor="ctr"/>
+          <a:lstStyle/>
+          <a:p>
+            <a:pPr algn="ctr"/>
+            <a:endParaRPr lang="pt-BR"/>
+          </a:p>
+        </p:txBody>
+      </p:sp>
+      <p:sp>
+        <p:nvSpPr>
+          <p:cNvPr id="12" name="Elipse 11">
+            <a:extLst>
+              <a:ext uri="{FF2B5EF4-FFF2-40B4-BE49-F238E27FC236}">
+                <a16:creationId xmlns:a16="http://schemas.microsoft.com/office/drawing/2014/main" id="{6B69A66E-FA75-C51B-BF92-60E77B838853}"/>
+              </a:ext>
+            </a:extLst>
+          </p:cNvPr>
+          <p:cNvSpPr/>
+          <p:nvPr/>
+        </p:nvSpPr>
+        <p:spPr>
+          <a:xfrm>
+            <a:off x="3875714" y="5033394"/>
+            <a:ext cx="402671" cy="402671"/>
+          </a:xfrm>
+          <a:prstGeom prst="ellipse">
+            <a:avLst/>
+          </a:prstGeom>
+          <a:noFill/>
+          <a:ln>
+            <a:solidFill>
+              <a:schemeClr val="tx1"/>
+            </a:solidFill>
+          </a:ln>
+        </p:spPr>
+        <p:style>
+          <a:lnRef idx="2">
+            <a:schemeClr val="accent1">
+              <a:shade val="50000"/>
+            </a:schemeClr>
+          </a:lnRef>
+          <a:fillRef idx="1">
+            <a:schemeClr val="accent1"/>
+          </a:fillRef>
+          <a:effectRef idx="0">
+            <a:schemeClr val="accent1"/>
+          </a:effectRef>
+          <a:fontRef idx="minor">
+            <a:schemeClr val="lt1"/>
+          </a:fontRef>
+        </p:style>
+        <p:txBody>
+          <a:bodyPr rtlCol="0" anchor="ctr"/>
+          <a:lstStyle/>
+          <a:p>
+            <a:pPr algn="ctr"/>
+            <a:endParaRPr lang="pt-BR"/>
+          </a:p>
+        </p:txBody>
+      </p:sp>
+      <p:sp>
+        <p:nvSpPr>
+          <p:cNvPr id="13" name="Retângulo 12">
+            <a:extLst>
+              <a:ext uri="{FF2B5EF4-FFF2-40B4-BE49-F238E27FC236}">
+                <a16:creationId xmlns:a16="http://schemas.microsoft.com/office/drawing/2014/main" id="{EFC593E1-E789-E793-3BB9-8EF28BC76E1B}"/>
+              </a:ext>
+            </a:extLst>
+          </p:cNvPr>
+          <p:cNvSpPr/>
+          <p:nvPr/>
+        </p:nvSpPr>
+        <p:spPr>
+          <a:xfrm>
+            <a:off x="5243120" y="1139856"/>
+            <a:ext cx="1213608" cy="816876"/>
+          </a:xfrm>
+          <a:prstGeom prst="rect">
+            <a:avLst/>
+          </a:prstGeom>
+          <a:noFill/>
+          <a:ln>
+            <a:solidFill>
+              <a:schemeClr val="tx1"/>
+            </a:solidFill>
+          </a:ln>
+        </p:spPr>
+        <p:style>
+          <a:lnRef idx="2">
+            <a:schemeClr val="accent1">
+              <a:shade val="50000"/>
+            </a:schemeClr>
+          </a:lnRef>
+          <a:fillRef idx="1">
+            <a:schemeClr val="accent1"/>
+          </a:fillRef>
+          <a:effectRef idx="0">
+            <a:schemeClr val="accent1"/>
+          </a:effectRef>
+          <a:fontRef idx="minor">
+            <a:schemeClr val="lt1"/>
+          </a:fontRef>
+        </p:style>
+        <p:txBody>
+          <a:bodyPr rtlCol="0" anchor="ctr"/>
+          <a:lstStyle/>
+          <a:p>
+            <a:pPr algn="ctr"/>
+            <a:endParaRPr lang="pt-BR"/>
+          </a:p>
+        </p:txBody>
+      </p:sp>
+      <p:sp>
+        <p:nvSpPr>
+          <p:cNvPr id="14" name="Retângulo 13">
+            <a:extLst>
+              <a:ext uri="{FF2B5EF4-FFF2-40B4-BE49-F238E27FC236}">
+                <a16:creationId xmlns:a16="http://schemas.microsoft.com/office/drawing/2014/main" id="{1C3F44B7-8945-D54D-71BC-36B1CFBF4BF8}"/>
+              </a:ext>
+            </a:extLst>
+          </p:cNvPr>
+          <p:cNvSpPr/>
+          <p:nvPr/>
+        </p:nvSpPr>
+        <p:spPr>
+          <a:xfrm>
+            <a:off x="4764947" y="5033394"/>
+            <a:ext cx="427840" cy="402671"/>
+          </a:xfrm>
+          <a:prstGeom prst="rect">
+            <a:avLst/>
+          </a:prstGeom>
+          <a:noFill/>
+          <a:ln>
+            <a:solidFill>
+              <a:schemeClr val="tx1"/>
+            </a:solidFill>
+          </a:ln>
+        </p:spPr>
+        <p:style>
+          <a:lnRef idx="2">
+            <a:schemeClr val="accent1">
+              <a:shade val="50000"/>
+            </a:schemeClr>
+          </a:lnRef>
+          <a:fillRef idx="1">
+            <a:schemeClr val="accent1"/>
+          </a:fillRef>
+          <a:effectRef idx="0">
+            <a:schemeClr val="accent1"/>
+          </a:effectRef>
+          <a:fontRef idx="minor">
+            <a:schemeClr val="lt1"/>
+          </a:fontRef>
+        </p:style>
+        <p:txBody>
+          <a:bodyPr rtlCol="0" anchor="ctr"/>
+          <a:lstStyle/>
+          <a:p>
+            <a:pPr algn="ctr"/>
+            <a:endParaRPr lang="pt-BR"/>
+          </a:p>
+        </p:txBody>
+      </p:sp>
+    </p:spTree>
+    <p:extLst>
+      <p:ext uri="{BB962C8B-B14F-4D97-AF65-F5344CB8AC3E}">
+        <p14:creationId xmlns:p14="http://schemas.microsoft.com/office/powerpoint/2010/main" val="3993582845"/>
+      </p:ext>
+    </p:extLst>
+  </p:cSld>
+  <p:clrMapOvr>
+    <a:masterClrMapping/>
+  </p:clrMapOvr>
+</p:sld>
+</file>
+
+<file path=ppt/slides/slide4.xml><?xml version="1.0" encoding="utf-8"?>
+<p:sld xmlns:a="http://schemas.openxmlformats.org/drawingml/2006/main" xmlns:r="http://schemas.openxmlformats.org/officeDocument/2006/relationships" xmlns:p="http://schemas.openxmlformats.org/presentationml/2006/main">
+  <p:cSld>
+    <p:spTree>
+      <p:nvGrpSpPr>
+        <p:cNvPr id="1" name=""/>
+        <p:cNvGrpSpPr/>
+        <p:nvPr/>
+      </p:nvGrpSpPr>
+      <p:grpSpPr>
+        <a:xfrm>
+          <a:off x="0" y="0"/>
+          <a:ext cx="0" cy="0"/>
+          <a:chOff x="0" y="0"/>
+          <a:chExt cx="0" cy="0"/>
+        </a:xfrm>
+      </p:grpSpPr>
+      <p:graphicFrame>
+        <p:nvGraphicFramePr>
+          <p:cNvPr id="2" name="Tabela 1">
+            <a:extLst>
+              <a:ext uri="{FF2B5EF4-FFF2-40B4-BE49-F238E27FC236}">
+                <a16:creationId xmlns:a16="http://schemas.microsoft.com/office/drawing/2014/main" id="{0CC982A5-FD1A-EB40-F5E0-175324C1A49C}"/>
+              </a:ext>
+            </a:extLst>
+          </p:cNvPr>
+          <p:cNvGraphicFramePr>
+            <a:graphicFrameLocks noGrp="1"/>
+          </p:cNvGraphicFramePr>
+          <p:nvPr/>
+        </p:nvGraphicFramePr>
+        <p:xfrm>
+          <a:off x="1006541" y="715161"/>
+          <a:ext cx="10544961" cy="5427677"/>
+        </p:xfrm>
+        <a:graphic>
+          <a:graphicData uri="http://schemas.openxmlformats.org/drawingml/2006/table">
+            <a:tbl>
+              <a:tblPr firstRow="1" bandRow="1">
+                <a:tableStyleId>{5940675A-B579-460E-94D1-54222C63F5DA}</a:tableStyleId>
+              </a:tblPr>
+              <a:tblGrid>
+                <a:gridCol w="2271421">
+                  <a:extLst>
+                    <a:ext uri="{9D8B030D-6E8A-4147-A177-3AD203B41FA5}">
+                      <a16:colId xmlns:a16="http://schemas.microsoft.com/office/drawing/2014/main" val="1800433837"/>
+                    </a:ext>
+                  </a:extLst>
+                </a:gridCol>
+                <a:gridCol w="8273540">
+                  <a:extLst>
+                    <a:ext uri="{9D8B030D-6E8A-4147-A177-3AD203B41FA5}">
+                      <a16:colId xmlns:a16="http://schemas.microsoft.com/office/drawing/2014/main" val="3383077286"/>
+                    </a:ext>
+                  </a:extLst>
+                </a:gridCol>
+              </a:tblGrid>
+              <a:tr h="1647427">
+                <a:tc gridSpan="2">
+                  <a:txBody>
+                    <a:bodyPr/>
+                    <a:lstStyle/>
+                    <a:p>
+                      <a:endParaRPr lang="pt-BR" dirty="0"/>
+                    </a:p>
+                  </a:txBody>
+                  <a:tcPr/>
+                </a:tc>
+                <a:tc hMerge="1">
+                  <a:txBody>
+                    <a:bodyPr/>
+                    <a:lstStyle/>
+                    <a:p>
+                      <a:endParaRPr lang="pt-BR" dirty="0"/>
+                    </a:p>
+                  </a:txBody>
+                  <a:tcPr/>
+                </a:tc>
+                <a:extLst>
+                  <a:ext uri="{0D108BD9-81ED-4DB2-BD59-A6C34878D82A}">
+                    <a16:rowId xmlns:a16="http://schemas.microsoft.com/office/drawing/2014/main" val="623206989"/>
+                  </a:ext>
+                </a:extLst>
+              </a:tr>
+              <a:tr h="3780250">
+                <a:tc>
+                  <a:txBody>
+                    <a:bodyPr/>
+                    <a:lstStyle/>
+                    <a:p>
+                      <a:endParaRPr lang="pt-BR" dirty="0"/>
+                    </a:p>
+                  </a:txBody>
+                  <a:tcPr/>
+                </a:tc>
+                <a:tc>
+                  <a:txBody>
+                    <a:bodyPr/>
+                    <a:lstStyle/>
+                    <a:p>
+                      <a:endParaRPr lang="pt-BR" dirty="0"/>
+                    </a:p>
+                  </a:txBody>
+                  <a:tcPr/>
+                </a:tc>
+                <a:extLst>
+                  <a:ext uri="{0D108BD9-81ED-4DB2-BD59-A6C34878D82A}">
+                    <a16:rowId xmlns:a16="http://schemas.microsoft.com/office/drawing/2014/main" val="1917346188"/>
+                  </a:ext>
+                </a:extLst>
+              </a:tr>
+            </a:tbl>
+          </a:graphicData>
+        </a:graphic>
+      </p:graphicFrame>
+      <p:sp>
+        <p:nvSpPr>
+          <p:cNvPr id="3" name="Retângulo 2">
+            <a:extLst>
+              <a:ext uri="{FF2B5EF4-FFF2-40B4-BE49-F238E27FC236}">
+                <a16:creationId xmlns:a16="http://schemas.microsoft.com/office/drawing/2014/main" id="{3BA78ABB-EE1C-3BB2-4B2E-0D8F2FCB6EC4}"/>
+              </a:ext>
+            </a:extLst>
+          </p:cNvPr>
+          <p:cNvSpPr/>
+          <p:nvPr/>
+        </p:nvSpPr>
+        <p:spPr>
+          <a:xfrm>
+            <a:off x="1149292" y="2499919"/>
+            <a:ext cx="1770077" cy="520118"/>
+          </a:xfrm>
+          <a:prstGeom prst="rect">
+            <a:avLst/>
+          </a:prstGeom>
+          <a:solidFill>
+            <a:schemeClr val="bg2">
+              <a:lumMod val="75000"/>
+            </a:schemeClr>
+          </a:solidFill>
+          <a:ln>
+            <a:solidFill>
+              <a:schemeClr val="tx1"/>
+            </a:solidFill>
+          </a:ln>
+        </p:spPr>
+        <p:style>
+          <a:lnRef idx="2">
+            <a:schemeClr val="accent1">
+              <a:shade val="50000"/>
+            </a:schemeClr>
+          </a:lnRef>
+          <a:fillRef idx="1">
+            <a:schemeClr val="accent1"/>
+          </a:fillRef>
+          <a:effectRef idx="0">
+            <a:schemeClr val="accent1"/>
+          </a:effectRef>
+          <a:fontRef idx="minor">
+            <a:schemeClr val="lt1"/>
+          </a:fontRef>
+        </p:style>
+        <p:txBody>
+          <a:bodyPr rtlCol="0" anchor="ctr"/>
+          <a:lstStyle/>
+          <a:p>
+            <a:pPr algn="ctr"/>
+            <a:endParaRPr lang="pt-BR"/>
+          </a:p>
+        </p:txBody>
+      </p:sp>
+      <p:graphicFrame>
+        <p:nvGraphicFramePr>
+          <p:cNvPr id="4" name="Tabela 4">
+            <a:extLst>
+              <a:ext uri="{FF2B5EF4-FFF2-40B4-BE49-F238E27FC236}">
+                <a16:creationId xmlns:a16="http://schemas.microsoft.com/office/drawing/2014/main" id="{8B7698AA-7537-D74F-B3F0-A833A44EB692}"/>
+              </a:ext>
+            </a:extLst>
+          </p:cNvPr>
+          <p:cNvGraphicFramePr>
+            <a:graphicFrameLocks noGrp="1"/>
+          </p:cNvGraphicFramePr>
+          <p:nvPr/>
         </p:nvGraphicFramePr>
         <p:xfrm>
           <a:off x="1023456" y="3211195"/>
@@ -3980,7 +5309,10 @@
                     <a:bodyPr/>
                     <a:lstStyle/>
                     <a:p>
-                      <a:endParaRPr lang="pt-BR"/>
+                      <a:r>
+                        <a:rPr lang="pt-BR" dirty="0"/>
+                        <a:t>Fulano de tal</a:t>
+                      </a:r>
                     </a:p>
                   </a:txBody>
                   <a:tcPr/>
@@ -4083,7 +5415,9 @@
           <a:prstGeom prst="rect">
             <a:avLst/>
           </a:prstGeom>
-          <a:noFill/>
+          <a:solidFill>
+            <a:schemeClr val="accent2"/>
+          </a:solidFill>
           <a:ln>
             <a:solidFill>
               <a:schemeClr val="tx1"/>
@@ -4135,7 +5469,9 @@
           <a:prstGeom prst="rect">
             <a:avLst/>
           </a:prstGeom>
-          <a:noFill/>
+          <a:solidFill>
+            <a:schemeClr val="bg1"/>
+          </a:solidFill>
           <a:ln>
             <a:solidFill>
               <a:schemeClr val="tx1"/>
@@ -4163,7 +5499,14 @@
           <a:lstStyle/>
           <a:p>
             <a:pPr algn="ctr"/>
-            <a:endParaRPr lang="pt-BR"/>
+            <a:r>
+              <a:rPr lang="pt-BR" dirty="0">
+                <a:solidFill>
+                  <a:schemeClr val="tx1"/>
+                </a:solidFill>
+              </a:rPr>
+              <a:t>Beltrano de tal</a:t>
+            </a:r>
           </a:p>
         </p:txBody>
       </p:sp>
@@ -4239,7 +5582,9 @@
           <a:prstGeom prst="rect">
             <a:avLst/>
           </a:prstGeom>
-          <a:noFill/>
+          <a:solidFill>
+            <a:schemeClr val="bg1"/>
+          </a:solidFill>
           <a:ln>
             <a:solidFill>
               <a:schemeClr val="tx1"/>
@@ -4267,7 +5612,19 @@
           <a:lstStyle/>
           <a:p>
             <a:pPr algn="ctr"/>
-            <a:endParaRPr lang="pt-BR"/>
+            <a:r>
+              <a:rPr lang="pt-BR" dirty="0" err="1">
+                <a:solidFill>
+                  <a:schemeClr val="tx1"/>
+                </a:solidFill>
+              </a:rPr>
+              <a:t>CargoId</a:t>
+            </a:r>
+            <a:endParaRPr lang="pt-BR" dirty="0">
+              <a:solidFill>
+                <a:schemeClr val="tx1"/>
+              </a:solidFill>
+            </a:endParaRPr>
           </a:p>
         </p:txBody>
       </p:sp>
@@ -4551,7 +5908,9 @@
           <a:prstGeom prst="rect">
             <a:avLst/>
           </a:prstGeom>
-          <a:noFill/>
+          <a:solidFill>
+            <a:schemeClr val="bg1"/>
+          </a:solidFill>
           <a:ln>
             <a:solidFill>
               <a:schemeClr val="tx1"/>
@@ -4586,7 +5945,7 @@
     </p:spTree>
     <p:extLst>
       <p:ext uri="{BB962C8B-B14F-4D97-AF65-F5344CB8AC3E}">
-        <p14:creationId xmlns:p14="http://schemas.microsoft.com/office/powerpoint/2010/main" val="3993582845"/>
+        <p14:creationId xmlns:p14="http://schemas.microsoft.com/office/powerpoint/2010/main" val="1369438977"/>
       </p:ext>
     </p:extLst>
   </p:cSld>
@@ -4596,7 +5955,7 @@
 </p:sld>
 </file>
 
-<file path=ppt/slides/slide3.xml><?xml version="1.0" encoding="utf-8"?>
+<file path=ppt/slides/slide5.xml><?xml version="1.0" encoding="utf-8"?>
 <p:sld xmlns:a="http://schemas.openxmlformats.org/drawingml/2006/main" xmlns:r="http://schemas.openxmlformats.org/officeDocument/2006/relationships" xmlns:p="http://schemas.openxmlformats.org/presentationml/2006/main">
   <p:cSld>
     <p:spTree>
@@ -5175,7 +6534,7 @@
 </p:sld>
 </file>
 
-<file path=ppt/slides/slide4.xml><?xml version="1.0" encoding="utf-8"?>
+<file path=ppt/slides/slide6.xml><?xml version="1.0" encoding="utf-8"?>
 <p:sld xmlns:a="http://schemas.openxmlformats.org/drawingml/2006/main" xmlns:r="http://schemas.openxmlformats.org/officeDocument/2006/relationships" xmlns:p="http://schemas.openxmlformats.org/presentationml/2006/main">
   <p:cSld>
     <p:spTree>

</xml_diff>